<commit_message>
Update Practical Arduino - Ground Up.pptx
</commit_message>
<xml_diff>
--- a/Practical Arduino - Ground Up.pptx
+++ b/Practical Arduino - Ground Up.pptx
@@ -107,6 +107,11 @@
       </a:defRPr>
     </a:lvl9pPr>
   </p:defaultTextStyle>
+  <p:extLst>
+    <p:ext uri="{EFAFB233-063F-42B5-8137-9DF3F51BA10A}">
+      <p15:sldGuideLst xmlns:p15="http://schemas.microsoft.com/office/powerpoint/2012/main"/>
+    </p:ext>
+  </p:extLst>
 </p:presentation>
 </file>
 
@@ -160,7 +165,7 @@
           <a:noFill/>
           <a:extLst>
             <a:ext uri="{909E8E84-426E-40dd-AFC4-6F175D3DCCD1}">
-              <a14:hiddenFill xmlns:a14="http://schemas.microsoft.com/office/drawing/2010/main" xmlns="">
+              <a14:hiddenFill xmlns="" xmlns:a14="http://schemas.microsoft.com/office/drawing/2010/main">
                 <a:solidFill>
                   <a:srgbClr val="FFFFFF"/>
                 </a:solidFill>
@@ -220,7 +225,7 @@
             </a:ln>
             <a:extLst>
               <a:ext uri="{91240B29-F687-4f45-9708-019B960494DF}">
-                <a14:hiddenLine xmlns:a14="http://schemas.microsoft.com/office/drawing/2010/main" xmlns="" w="9525">
+                <a14:hiddenLine xmlns="" xmlns:a14="http://schemas.microsoft.com/office/drawing/2010/main" w="9525">
                   <a:solidFill>
                     <a:srgbClr val="000000"/>
                   </a:solidFill>
@@ -310,7 +315,7 @@
             </a:ln>
             <a:extLst>
               <a:ext uri="{91240B29-F687-4f45-9708-019B960494DF}">
-                <a14:hiddenLine xmlns:a14="http://schemas.microsoft.com/office/drawing/2010/main" xmlns="" w="9525">
+                <a14:hiddenLine xmlns="" xmlns:a14="http://schemas.microsoft.com/office/drawing/2010/main" w="9525">
                   <a:solidFill>
                     <a:srgbClr val="000000"/>
                   </a:solidFill>
@@ -400,7 +405,7 @@
             </a:ln>
             <a:extLst>
               <a:ext uri="{91240B29-F687-4f45-9708-019B960494DF}">
-                <a14:hiddenLine xmlns:a14="http://schemas.microsoft.com/office/drawing/2010/main" xmlns="" w="9525">
+                <a14:hiddenLine xmlns="" xmlns:a14="http://schemas.microsoft.com/office/drawing/2010/main" w="9525">
                   <a:solidFill>
                     <a:srgbClr val="000000"/>
                   </a:solidFill>
@@ -434,7 +439,7 @@
             </a:ln>
             <a:extLst>
               <a:ext uri="{91240B29-F687-4f45-9708-019B960494DF}">
-                <a14:hiddenLine xmlns:a14="http://schemas.microsoft.com/office/drawing/2010/main" xmlns="" w="9525">
+                <a14:hiddenLine xmlns="" xmlns:a14="http://schemas.microsoft.com/office/drawing/2010/main" w="9525">
                   <a:solidFill>
                     <a:srgbClr val="000000"/>
                   </a:solidFill>
@@ -524,7 +529,7 @@
             </a:ln>
             <a:extLst>
               <a:ext uri="{91240B29-F687-4f45-9708-019B960494DF}">
-                <a14:hiddenLine xmlns:a14="http://schemas.microsoft.com/office/drawing/2010/main" xmlns="" w="9525">
+                <a14:hiddenLine xmlns="" xmlns:a14="http://schemas.microsoft.com/office/drawing/2010/main" w="9525">
                   <a:solidFill>
                     <a:srgbClr val="000000"/>
                   </a:solidFill>
@@ -586,7 +591,7 @@
             </a:ln>
             <a:extLst>
               <a:ext uri="{91240B29-F687-4f45-9708-019B960494DF}">
-                <a14:hiddenLine xmlns:a14="http://schemas.microsoft.com/office/drawing/2010/main" xmlns="" w="9525">
+                <a14:hiddenLine xmlns="" xmlns:a14="http://schemas.microsoft.com/office/drawing/2010/main" w="9525">
                   <a:solidFill>
                     <a:srgbClr val="000000"/>
                   </a:solidFill>
@@ -648,7 +653,7 @@
             </a:ln>
             <a:extLst>
               <a:ext uri="{91240B29-F687-4f45-9708-019B960494DF}">
-                <a14:hiddenLine xmlns:a14="http://schemas.microsoft.com/office/drawing/2010/main" xmlns="" w="9525">
+                <a14:hiddenLine xmlns="" xmlns:a14="http://schemas.microsoft.com/office/drawing/2010/main" w="9525">
                   <a:solidFill>
                     <a:srgbClr val="000000"/>
                   </a:solidFill>
@@ -738,7 +743,7 @@
             </a:ln>
             <a:extLst>
               <a:ext uri="{91240B29-F687-4f45-9708-019B960494DF}">
-                <a14:hiddenLine xmlns:a14="http://schemas.microsoft.com/office/drawing/2010/main" xmlns="" w="9525">
+                <a14:hiddenLine xmlns="" xmlns:a14="http://schemas.microsoft.com/office/drawing/2010/main" w="9525">
                   <a:solidFill>
                     <a:srgbClr val="000000"/>
                   </a:solidFill>
@@ -800,7 +805,7 @@
             </a:ln>
             <a:extLst>
               <a:ext uri="{91240B29-F687-4f45-9708-019B960494DF}">
-                <a14:hiddenLine xmlns:a14="http://schemas.microsoft.com/office/drawing/2010/main" xmlns="" w="9525">
+                <a14:hiddenLine xmlns="" xmlns:a14="http://schemas.microsoft.com/office/drawing/2010/main" w="9525">
                   <a:solidFill>
                     <a:srgbClr val="000000"/>
                   </a:solidFill>
@@ -862,7 +867,7 @@
             </a:ln>
             <a:extLst>
               <a:ext uri="{91240B29-F687-4f45-9708-019B960494DF}">
-                <a14:hiddenLine xmlns:a14="http://schemas.microsoft.com/office/drawing/2010/main" xmlns="" w="9525">
+                <a14:hiddenLine xmlns="" xmlns:a14="http://schemas.microsoft.com/office/drawing/2010/main" w="9525">
                   <a:solidFill>
                     <a:srgbClr val="000000"/>
                   </a:solidFill>
@@ -952,7 +957,7 @@
             </a:ln>
             <a:extLst>
               <a:ext uri="{91240B29-F687-4f45-9708-019B960494DF}">
-                <a14:hiddenLine xmlns:a14="http://schemas.microsoft.com/office/drawing/2010/main" xmlns="" w="9525">
+                <a14:hiddenLine xmlns="" xmlns:a14="http://schemas.microsoft.com/office/drawing/2010/main" w="9525">
                   <a:solidFill>
                     <a:srgbClr val="000000"/>
                   </a:solidFill>
@@ -1042,7 +1047,7 @@
             </a:ln>
             <a:extLst>
               <a:ext uri="{91240B29-F687-4f45-9708-019B960494DF}">
-                <a14:hiddenLine xmlns:a14="http://schemas.microsoft.com/office/drawing/2010/main" xmlns="" w="9525">
+                <a14:hiddenLine xmlns="" xmlns:a14="http://schemas.microsoft.com/office/drawing/2010/main" w="9525">
                   <a:solidFill>
                     <a:srgbClr val="000000"/>
                   </a:solidFill>
@@ -1104,7 +1109,7 @@
             </a:ln>
             <a:extLst>
               <a:ext uri="{91240B29-F687-4f45-9708-019B960494DF}">
-                <a14:hiddenLine xmlns:a14="http://schemas.microsoft.com/office/drawing/2010/main" xmlns="" w="9525">
+                <a14:hiddenLine xmlns="" xmlns:a14="http://schemas.microsoft.com/office/drawing/2010/main" w="9525">
                   <a:solidFill>
                     <a:srgbClr val="000000"/>
                   </a:solidFill>
@@ -1214,7 +1219,7 @@
             </a:ln>
             <a:extLst>
               <a:ext uri="{91240B29-F687-4f45-9708-019B960494DF}">
-                <a14:hiddenLine xmlns:a14="http://schemas.microsoft.com/office/drawing/2010/main" xmlns="" w="9525">
+                <a14:hiddenLine xmlns="" xmlns:a14="http://schemas.microsoft.com/office/drawing/2010/main" w="9525">
                   <a:solidFill>
                     <a:srgbClr val="000000"/>
                   </a:solidFill>
@@ -1276,7 +1281,7 @@
             </a:ln>
             <a:extLst>
               <a:ext uri="{91240B29-F687-4f45-9708-019B960494DF}">
-                <a14:hiddenLine xmlns:a14="http://schemas.microsoft.com/office/drawing/2010/main" xmlns="" w="9525">
+                <a14:hiddenLine xmlns="" xmlns:a14="http://schemas.microsoft.com/office/drawing/2010/main" w="9525">
                   <a:solidFill>
                     <a:srgbClr val="000000"/>
                   </a:solidFill>
@@ -1366,7 +1371,7 @@
             </a:ln>
             <a:extLst>
               <a:ext uri="{91240B29-F687-4f45-9708-019B960494DF}">
-                <a14:hiddenLine xmlns:a14="http://schemas.microsoft.com/office/drawing/2010/main" xmlns="" w="9525">
+                <a14:hiddenLine xmlns="" xmlns:a14="http://schemas.microsoft.com/office/drawing/2010/main" w="9525">
                   <a:solidFill>
                     <a:srgbClr val="000000"/>
                   </a:solidFill>
@@ -1456,7 +1461,7 @@
             </a:ln>
             <a:extLst>
               <a:ext uri="{91240B29-F687-4f45-9708-019B960494DF}">
-                <a14:hiddenLine xmlns:a14="http://schemas.microsoft.com/office/drawing/2010/main" xmlns="" w="9525">
+                <a14:hiddenLine xmlns="" xmlns:a14="http://schemas.microsoft.com/office/drawing/2010/main" w="9525">
                   <a:solidFill>
                     <a:srgbClr val="000000"/>
                   </a:solidFill>
@@ -1518,7 +1523,7 @@
             </a:ln>
             <a:extLst>
               <a:ext uri="{91240B29-F687-4f45-9708-019B960494DF}">
-                <a14:hiddenLine xmlns:a14="http://schemas.microsoft.com/office/drawing/2010/main" xmlns="" w="9525">
+                <a14:hiddenLine xmlns="" xmlns:a14="http://schemas.microsoft.com/office/drawing/2010/main" w="9525">
                   <a:solidFill>
                     <a:srgbClr val="000000"/>
                   </a:solidFill>
@@ -1608,7 +1613,7 @@
             </a:ln>
             <a:extLst>
               <a:ext uri="{91240B29-F687-4f45-9708-019B960494DF}">
-                <a14:hiddenLine xmlns:a14="http://schemas.microsoft.com/office/drawing/2010/main" xmlns="" w="9525">
+                <a14:hiddenLine xmlns="" xmlns:a14="http://schemas.microsoft.com/office/drawing/2010/main" w="9525">
                   <a:solidFill>
                     <a:srgbClr val="000000"/>
                   </a:solidFill>
@@ -1698,7 +1703,7 @@
             </a:ln>
             <a:extLst>
               <a:ext uri="{91240B29-F687-4f45-9708-019B960494DF}">
-                <a14:hiddenLine xmlns:a14="http://schemas.microsoft.com/office/drawing/2010/main" xmlns="" w="9525">
+                <a14:hiddenLine xmlns="" xmlns:a14="http://schemas.microsoft.com/office/drawing/2010/main" w="9525">
                   <a:solidFill>
                     <a:srgbClr val="000000"/>
                   </a:solidFill>
@@ -1754,7 +1759,7 @@
             </a:ln>
             <a:extLst>
               <a:ext uri="{91240B29-F687-4f45-9708-019B960494DF}">
-                <a14:hiddenLine xmlns:a14="http://schemas.microsoft.com/office/drawing/2010/main" xmlns="" w="9525">
+                <a14:hiddenLine xmlns="" xmlns:a14="http://schemas.microsoft.com/office/drawing/2010/main" w="9525">
                   <a:solidFill>
                     <a:srgbClr val="000000"/>
                   </a:solidFill>
@@ -1844,7 +1849,7 @@
             </a:ln>
             <a:extLst>
               <a:ext uri="{91240B29-F687-4f45-9708-019B960494DF}">
-                <a14:hiddenLine xmlns:a14="http://schemas.microsoft.com/office/drawing/2010/main" xmlns="" w="9525">
+                <a14:hiddenLine xmlns="" xmlns:a14="http://schemas.microsoft.com/office/drawing/2010/main" w="9525">
                   <a:solidFill>
                     <a:srgbClr val="000000"/>
                   </a:solidFill>
@@ -1900,7 +1905,7 @@
             </a:ln>
             <a:extLst>
               <a:ext uri="{91240B29-F687-4f45-9708-019B960494DF}">
-                <a14:hiddenLine xmlns:a14="http://schemas.microsoft.com/office/drawing/2010/main" xmlns="" w="9525">
+                <a14:hiddenLine xmlns="" xmlns:a14="http://schemas.microsoft.com/office/drawing/2010/main" w="9525">
                   <a:solidFill>
                     <a:srgbClr val="000000"/>
                   </a:solidFill>
@@ -1990,7 +1995,7 @@
             </a:ln>
             <a:extLst>
               <a:ext uri="{91240B29-F687-4f45-9708-019B960494DF}">
-                <a14:hiddenLine xmlns:a14="http://schemas.microsoft.com/office/drawing/2010/main" xmlns="" w="9525">
+                <a14:hiddenLine xmlns="" xmlns:a14="http://schemas.microsoft.com/office/drawing/2010/main" w="9525">
                   <a:solidFill>
                     <a:srgbClr val="000000"/>
                   </a:solidFill>
@@ -2058,7 +2063,7 @@
             </a:ln>
             <a:extLst>
               <a:ext uri="{91240B29-F687-4f45-9708-019B960494DF}">
-                <a14:hiddenLine xmlns:a14="http://schemas.microsoft.com/office/drawing/2010/main" xmlns="" w="9525">
+                <a14:hiddenLine xmlns="" xmlns:a14="http://schemas.microsoft.com/office/drawing/2010/main" w="9525">
                   <a:solidFill>
                     <a:srgbClr val="000000"/>
                   </a:solidFill>
@@ -2148,7 +2153,7 @@
             </a:ln>
             <a:extLst>
               <a:ext uri="{91240B29-F687-4f45-9708-019B960494DF}">
-                <a14:hiddenLine xmlns:a14="http://schemas.microsoft.com/office/drawing/2010/main" xmlns="" w="9525">
+                <a14:hiddenLine xmlns="" xmlns:a14="http://schemas.microsoft.com/office/drawing/2010/main" w="9525">
                   <a:solidFill>
                     <a:srgbClr val="000000"/>
                   </a:solidFill>
@@ -2216,7 +2221,7 @@
             </a:ln>
             <a:extLst>
               <a:ext uri="{91240B29-F687-4f45-9708-019B960494DF}">
-                <a14:hiddenLine xmlns:a14="http://schemas.microsoft.com/office/drawing/2010/main" xmlns="" w="9525">
+                <a14:hiddenLine xmlns="" xmlns:a14="http://schemas.microsoft.com/office/drawing/2010/main" w="9525">
                   <a:solidFill>
                     <a:srgbClr val="000000"/>
                   </a:solidFill>
@@ -2306,7 +2311,7 @@
             </a:ln>
             <a:extLst>
               <a:ext uri="{91240B29-F687-4f45-9708-019B960494DF}">
-                <a14:hiddenLine xmlns:a14="http://schemas.microsoft.com/office/drawing/2010/main" xmlns="" w="9525">
+                <a14:hiddenLine xmlns="" xmlns:a14="http://schemas.microsoft.com/office/drawing/2010/main" w="9525">
                   <a:solidFill>
                     <a:srgbClr val="000000"/>
                   </a:solidFill>
@@ -2340,7 +2345,7 @@
             </a:ln>
             <a:extLst>
               <a:ext uri="{91240B29-F687-4f45-9708-019B960494DF}">
-                <a14:hiddenLine xmlns:a14="http://schemas.microsoft.com/office/drawing/2010/main" xmlns="" w="9525">
+                <a14:hiddenLine xmlns="" xmlns:a14="http://schemas.microsoft.com/office/drawing/2010/main" w="9525">
                   <a:solidFill>
                     <a:srgbClr val="000000"/>
                   </a:solidFill>
@@ -2430,7 +2435,7 @@
             </a:ln>
             <a:extLst>
               <a:ext uri="{91240B29-F687-4f45-9708-019B960494DF}">
-                <a14:hiddenLine xmlns:a14="http://schemas.microsoft.com/office/drawing/2010/main" xmlns="" w="9525">
+                <a14:hiddenLine xmlns="" xmlns:a14="http://schemas.microsoft.com/office/drawing/2010/main" w="9525">
                   <a:solidFill>
                     <a:srgbClr val="000000"/>
                   </a:solidFill>
@@ -2492,7 +2497,7 @@
             </a:ln>
             <a:extLst>
               <a:ext uri="{91240B29-F687-4f45-9708-019B960494DF}">
-                <a14:hiddenLine xmlns:a14="http://schemas.microsoft.com/office/drawing/2010/main" xmlns="" w="9525">
+                <a14:hiddenLine xmlns="" xmlns:a14="http://schemas.microsoft.com/office/drawing/2010/main" w="9525">
                   <a:solidFill>
                     <a:srgbClr val="000000"/>
                   </a:solidFill>
@@ -2554,7 +2559,7 @@
             </a:ln>
             <a:extLst>
               <a:ext uri="{91240B29-F687-4f45-9708-019B960494DF}">
-                <a14:hiddenLine xmlns:a14="http://schemas.microsoft.com/office/drawing/2010/main" xmlns="" w="9525">
+                <a14:hiddenLine xmlns="" xmlns:a14="http://schemas.microsoft.com/office/drawing/2010/main" w="9525">
                   <a:solidFill>
                     <a:srgbClr val="000000"/>
                   </a:solidFill>
@@ -2644,7 +2649,7 @@
             </a:ln>
             <a:extLst>
               <a:ext uri="{91240B29-F687-4f45-9708-019B960494DF}">
-                <a14:hiddenLine xmlns:a14="http://schemas.microsoft.com/office/drawing/2010/main" xmlns="" w="9525">
+                <a14:hiddenLine xmlns="" xmlns:a14="http://schemas.microsoft.com/office/drawing/2010/main" w="9525">
                   <a:solidFill>
                     <a:srgbClr val="000000"/>
                   </a:solidFill>
@@ -2712,7 +2717,7 @@
             </a:ln>
             <a:extLst>
               <a:ext uri="{91240B29-F687-4f45-9708-019B960494DF}">
-                <a14:hiddenLine xmlns:a14="http://schemas.microsoft.com/office/drawing/2010/main" xmlns="" w="9525">
+                <a14:hiddenLine xmlns="" xmlns:a14="http://schemas.microsoft.com/office/drawing/2010/main" w="9525">
                   <a:solidFill>
                     <a:srgbClr val="000000"/>
                   </a:solidFill>
@@ -2774,7 +2779,7 @@
             </a:ln>
             <a:extLst>
               <a:ext uri="{91240B29-F687-4f45-9708-019B960494DF}">
-                <a14:hiddenLine xmlns:a14="http://schemas.microsoft.com/office/drawing/2010/main" xmlns="" w="9525">
+                <a14:hiddenLine xmlns="" xmlns:a14="http://schemas.microsoft.com/office/drawing/2010/main" w="9525">
                   <a:solidFill>
                     <a:srgbClr val="000000"/>
                   </a:solidFill>
@@ -2864,7 +2869,7 @@
             </a:ln>
             <a:extLst>
               <a:ext uri="{91240B29-F687-4f45-9708-019B960494DF}">
-                <a14:hiddenLine xmlns:a14="http://schemas.microsoft.com/office/drawing/2010/main" xmlns="" w="9525">
+                <a14:hiddenLine xmlns="" xmlns:a14="http://schemas.microsoft.com/office/drawing/2010/main" w="9525">
                   <a:solidFill>
                     <a:srgbClr val="000000"/>
                   </a:solidFill>
@@ -2926,7 +2931,7 @@
             </a:ln>
             <a:extLst>
               <a:ext uri="{91240B29-F687-4f45-9708-019B960494DF}">
-                <a14:hiddenLine xmlns:a14="http://schemas.microsoft.com/office/drawing/2010/main" xmlns="" w="9525">
+                <a14:hiddenLine xmlns="" xmlns:a14="http://schemas.microsoft.com/office/drawing/2010/main" w="9525">
                   <a:solidFill>
                     <a:srgbClr val="000000"/>
                   </a:solidFill>
@@ -3016,7 +3021,7 @@
             </a:ln>
             <a:extLst>
               <a:ext uri="{91240B29-F687-4f45-9708-019B960494DF}">
-                <a14:hiddenLine xmlns:a14="http://schemas.microsoft.com/office/drawing/2010/main" xmlns="" w="9525">
+                <a14:hiddenLine xmlns="" xmlns:a14="http://schemas.microsoft.com/office/drawing/2010/main" w="9525">
                   <a:solidFill>
                     <a:srgbClr val="000000"/>
                   </a:solidFill>
@@ -3078,7 +3083,7 @@
             </a:ln>
             <a:extLst>
               <a:ext uri="{91240B29-F687-4f45-9708-019B960494DF}">
-                <a14:hiddenLine xmlns:a14="http://schemas.microsoft.com/office/drawing/2010/main" xmlns="" w="9525">
+                <a14:hiddenLine xmlns="" xmlns:a14="http://schemas.microsoft.com/office/drawing/2010/main" w="9525">
                   <a:solidFill>
                     <a:srgbClr val="000000"/>
                   </a:solidFill>
@@ -3168,7 +3173,7 @@
             </a:ln>
             <a:extLst>
               <a:ext uri="{91240B29-F687-4f45-9708-019B960494DF}">
-                <a14:hiddenLine xmlns:a14="http://schemas.microsoft.com/office/drawing/2010/main" xmlns="" w="9525">
+                <a14:hiddenLine xmlns="" xmlns:a14="http://schemas.microsoft.com/office/drawing/2010/main" w="9525">
                   <a:solidFill>
                     <a:srgbClr val="000000"/>
                   </a:solidFill>
@@ -3202,7 +3207,7 @@
             </a:ln>
             <a:extLst>
               <a:ext uri="{91240B29-F687-4f45-9708-019B960494DF}">
-                <a14:hiddenLine xmlns:a14="http://schemas.microsoft.com/office/drawing/2010/main" xmlns="" w="9525">
+                <a14:hiddenLine xmlns="" xmlns:a14="http://schemas.microsoft.com/office/drawing/2010/main" w="9525">
                   <a:solidFill>
                     <a:srgbClr val="000000"/>
                   </a:solidFill>
@@ -3267,7 +3272,7 @@
             </a:ln>
             <a:extLst>
               <a:ext uri="{91240B29-F687-4f45-9708-019B960494DF}">
-                <a14:hiddenLine xmlns:a14="http://schemas.microsoft.com/office/drawing/2010/main" xmlns="" w="9525">
+                <a14:hiddenLine xmlns="" xmlns:a14="http://schemas.microsoft.com/office/drawing/2010/main" w="9525">
                   <a:solidFill>
                     <a:srgbClr val="000000"/>
                   </a:solidFill>
@@ -3357,7 +3362,7 @@
             </a:ln>
             <a:extLst>
               <a:ext uri="{91240B29-F687-4f45-9708-019B960494DF}">
-                <a14:hiddenLine xmlns:a14="http://schemas.microsoft.com/office/drawing/2010/main" xmlns="" w="9525">
+                <a14:hiddenLine xmlns="" xmlns:a14="http://schemas.microsoft.com/office/drawing/2010/main" w="9525">
                   <a:solidFill>
                     <a:srgbClr val="000000"/>
                   </a:solidFill>
@@ -3419,7 +3424,7 @@
             </a:ln>
             <a:extLst>
               <a:ext uri="{91240B29-F687-4f45-9708-019B960494DF}">
-                <a14:hiddenLine xmlns:a14="http://schemas.microsoft.com/office/drawing/2010/main" xmlns="" w="9525">
+                <a14:hiddenLine xmlns="" xmlns:a14="http://schemas.microsoft.com/office/drawing/2010/main" w="9525">
                   <a:solidFill>
                     <a:srgbClr val="000000"/>
                   </a:solidFill>
@@ -3509,7 +3514,7 @@
             </a:ln>
             <a:extLst>
               <a:ext uri="{91240B29-F687-4f45-9708-019B960494DF}">
-                <a14:hiddenLine xmlns:a14="http://schemas.microsoft.com/office/drawing/2010/main" xmlns="" w="9525">
+                <a14:hiddenLine xmlns="" xmlns:a14="http://schemas.microsoft.com/office/drawing/2010/main" w="9525">
                   <a:solidFill>
                     <a:srgbClr val="000000"/>
                   </a:solidFill>
@@ -3599,7 +3604,7 @@
             </a:ln>
             <a:extLst>
               <a:ext uri="{91240B29-F687-4f45-9708-019B960494DF}">
-                <a14:hiddenLine xmlns:a14="http://schemas.microsoft.com/office/drawing/2010/main" xmlns="" w="9525">
+                <a14:hiddenLine xmlns="" xmlns:a14="http://schemas.microsoft.com/office/drawing/2010/main" w="9525">
                   <a:solidFill>
                     <a:srgbClr val="000000"/>
                   </a:solidFill>
@@ -3664,7 +3669,7 @@
             </a:ln>
             <a:extLst>
               <a:ext uri="{91240B29-F687-4f45-9708-019B960494DF}">
-                <a14:hiddenLine xmlns:a14="http://schemas.microsoft.com/office/drawing/2010/main" xmlns="" w="9525">
+                <a14:hiddenLine xmlns="" xmlns:a14="http://schemas.microsoft.com/office/drawing/2010/main" w="9525">
                   <a:solidFill>
                     <a:srgbClr val="000000"/>
                   </a:solidFill>
@@ -3726,7 +3731,7 @@
             </a:ln>
             <a:extLst>
               <a:ext uri="{91240B29-F687-4f45-9708-019B960494DF}">
-                <a14:hiddenLine xmlns:a14="http://schemas.microsoft.com/office/drawing/2010/main" xmlns="" w="9525">
+                <a14:hiddenLine xmlns="" xmlns:a14="http://schemas.microsoft.com/office/drawing/2010/main" w="9525">
                   <a:solidFill>
                     <a:srgbClr val="000000"/>
                   </a:solidFill>
@@ -3816,7 +3821,7 @@
             </a:ln>
             <a:extLst>
               <a:ext uri="{91240B29-F687-4f45-9708-019B960494DF}">
-                <a14:hiddenLine xmlns:a14="http://schemas.microsoft.com/office/drawing/2010/main" xmlns="" w="9525">
+                <a14:hiddenLine xmlns="" xmlns:a14="http://schemas.microsoft.com/office/drawing/2010/main" w="9525">
                   <a:solidFill>
                     <a:srgbClr val="000000"/>
                   </a:solidFill>
@@ -3906,7 +3911,7 @@
             </a:ln>
             <a:extLst>
               <a:ext uri="{91240B29-F687-4f45-9708-019B960494DF}">
-                <a14:hiddenLine xmlns:a14="http://schemas.microsoft.com/office/drawing/2010/main" xmlns="" w="9525">
+                <a14:hiddenLine xmlns="" xmlns:a14="http://schemas.microsoft.com/office/drawing/2010/main" w="9525">
                   <a:solidFill>
                     <a:srgbClr val="000000"/>
                   </a:solidFill>
@@ -3968,7 +3973,7 @@
             </a:ln>
             <a:extLst>
               <a:ext uri="{91240B29-F687-4f45-9708-019B960494DF}">
-                <a14:hiddenLine xmlns:a14="http://schemas.microsoft.com/office/drawing/2010/main" xmlns="" w="9525">
+                <a14:hiddenLine xmlns="" xmlns:a14="http://schemas.microsoft.com/office/drawing/2010/main" w="9525">
                   <a:solidFill>
                     <a:srgbClr val="000000"/>
                   </a:solidFill>
@@ -4088,7 +4093,7 @@
             </a:ln>
             <a:extLst>
               <a:ext uri="{91240B29-F687-4f45-9708-019B960494DF}">
-                <a14:hiddenLine xmlns:a14="http://schemas.microsoft.com/office/drawing/2010/main" xmlns="" w="9525">
+                <a14:hiddenLine xmlns="" xmlns:a14="http://schemas.microsoft.com/office/drawing/2010/main" w="9525">
                   <a:solidFill>
                     <a:srgbClr val="000000"/>
                   </a:solidFill>
@@ -4156,7 +4161,7 @@
             </a:ln>
             <a:extLst>
               <a:ext uri="{91240B29-F687-4f45-9708-019B960494DF}">
-                <a14:hiddenLine xmlns:a14="http://schemas.microsoft.com/office/drawing/2010/main" xmlns="" w="9525">
+                <a14:hiddenLine xmlns="" xmlns:a14="http://schemas.microsoft.com/office/drawing/2010/main" w="9525">
                   <a:solidFill>
                     <a:srgbClr val="000000"/>
                   </a:solidFill>
@@ -4246,7 +4251,7 @@
             </a:ln>
             <a:extLst>
               <a:ext uri="{91240B29-F687-4f45-9708-019B960494DF}">
-                <a14:hiddenLine xmlns:a14="http://schemas.microsoft.com/office/drawing/2010/main" xmlns="" w="9525">
+                <a14:hiddenLine xmlns="" xmlns:a14="http://schemas.microsoft.com/office/drawing/2010/main" w="9525">
                   <a:solidFill>
                     <a:srgbClr val="000000"/>
                   </a:solidFill>
@@ -8968,7 +8973,7 @@
           <a:noFill/>
           <a:extLst>
             <a:ext uri="{909E8E84-426E-40dd-AFC4-6F175D3DCCD1}">
-              <a14:hiddenFill xmlns:a14="http://schemas.microsoft.com/office/drawing/2010/main" xmlns="">
+              <a14:hiddenFill xmlns="" xmlns:a14="http://schemas.microsoft.com/office/drawing/2010/main">
                 <a:solidFill>
                   <a:srgbClr val="FFFFFF"/>
                 </a:solidFill>
@@ -9042,7 +9047,7 @@
               </a:ln>
               <a:extLst>
                 <a:ext uri="{91240B29-F687-4f45-9708-019B960494DF}">
-                  <a14:hiddenLine xmlns:a14="http://schemas.microsoft.com/office/drawing/2010/main" xmlns="" w="9525">
+                  <a14:hiddenLine xmlns="" xmlns:a14="http://schemas.microsoft.com/office/drawing/2010/main" w="9525">
                     <a:solidFill>
                       <a:srgbClr val="000000"/>
                     </a:solidFill>
@@ -9132,7 +9137,7 @@
               </a:ln>
               <a:extLst>
                 <a:ext uri="{91240B29-F687-4f45-9708-019B960494DF}">
-                  <a14:hiddenLine xmlns:a14="http://schemas.microsoft.com/office/drawing/2010/main" xmlns="" w="9525">
+                  <a14:hiddenLine xmlns="" xmlns:a14="http://schemas.microsoft.com/office/drawing/2010/main" w="9525">
                     <a:solidFill>
                       <a:srgbClr val="000000"/>
                     </a:solidFill>
@@ -9222,7 +9227,7 @@
               </a:ln>
               <a:extLst>
                 <a:ext uri="{91240B29-F687-4f45-9708-019B960494DF}">
-                  <a14:hiddenLine xmlns:a14="http://schemas.microsoft.com/office/drawing/2010/main" xmlns="" w="9525">
+                  <a14:hiddenLine xmlns="" xmlns:a14="http://schemas.microsoft.com/office/drawing/2010/main" w="9525">
                     <a:solidFill>
                       <a:srgbClr val="000000"/>
                     </a:solidFill>
@@ -9284,7 +9289,7 @@
               </a:ln>
               <a:extLst>
                 <a:ext uri="{91240B29-F687-4f45-9708-019B960494DF}">
-                  <a14:hiddenLine xmlns:a14="http://schemas.microsoft.com/office/drawing/2010/main" xmlns="" w="9525">
+                  <a14:hiddenLine xmlns="" xmlns:a14="http://schemas.microsoft.com/office/drawing/2010/main" w="9525">
                     <a:solidFill>
                       <a:srgbClr val="000000"/>
                     </a:solidFill>
@@ -9374,7 +9379,7 @@
               </a:ln>
               <a:extLst>
                 <a:ext uri="{91240B29-F687-4f45-9708-019B960494DF}">
-                  <a14:hiddenLine xmlns:a14="http://schemas.microsoft.com/office/drawing/2010/main" xmlns="" w="9525">
+                  <a14:hiddenLine xmlns="" xmlns:a14="http://schemas.microsoft.com/office/drawing/2010/main" w="9525">
                     <a:solidFill>
                       <a:srgbClr val="000000"/>
                     </a:solidFill>
@@ -9436,7 +9441,7 @@
               </a:ln>
               <a:extLst>
                 <a:ext uri="{91240B29-F687-4f45-9708-019B960494DF}">
-                  <a14:hiddenLine xmlns:a14="http://schemas.microsoft.com/office/drawing/2010/main" xmlns="" w="9525">
+                  <a14:hiddenLine xmlns="" xmlns:a14="http://schemas.microsoft.com/office/drawing/2010/main" w="9525">
                     <a:solidFill>
                       <a:srgbClr val="000000"/>
                     </a:solidFill>
@@ -9498,7 +9503,7 @@
               </a:ln>
               <a:extLst>
                 <a:ext uri="{91240B29-F687-4f45-9708-019B960494DF}">
-                  <a14:hiddenLine xmlns:a14="http://schemas.microsoft.com/office/drawing/2010/main" xmlns="" w="9525">
+                  <a14:hiddenLine xmlns="" xmlns:a14="http://schemas.microsoft.com/office/drawing/2010/main" w="9525">
                     <a:solidFill>
                       <a:srgbClr val="000000"/>
                     </a:solidFill>
@@ -9588,7 +9593,7 @@
               </a:ln>
               <a:extLst>
                 <a:ext uri="{91240B29-F687-4f45-9708-019B960494DF}">
-                  <a14:hiddenLine xmlns:a14="http://schemas.microsoft.com/office/drawing/2010/main" xmlns="" w="9525">
+                  <a14:hiddenLine xmlns="" xmlns:a14="http://schemas.microsoft.com/office/drawing/2010/main" w="9525">
                     <a:solidFill>
                       <a:srgbClr val="000000"/>
                     </a:solidFill>
@@ -9678,7 +9683,7 @@
               </a:ln>
               <a:extLst>
                 <a:ext uri="{91240B29-F687-4f45-9708-019B960494DF}">
-                  <a14:hiddenLine xmlns:a14="http://schemas.microsoft.com/office/drawing/2010/main" xmlns="" w="9525">
+                  <a14:hiddenLine xmlns="" xmlns:a14="http://schemas.microsoft.com/office/drawing/2010/main" w="9525">
                     <a:solidFill>
                       <a:srgbClr val="000000"/>
                     </a:solidFill>
@@ -9740,7 +9745,7 @@
               </a:ln>
               <a:extLst>
                 <a:ext uri="{91240B29-F687-4f45-9708-019B960494DF}">
-                  <a14:hiddenLine xmlns:a14="http://schemas.microsoft.com/office/drawing/2010/main" xmlns="" w="9525">
+                  <a14:hiddenLine xmlns="" xmlns:a14="http://schemas.microsoft.com/office/drawing/2010/main" w="9525">
                     <a:solidFill>
                       <a:srgbClr val="000000"/>
                     </a:solidFill>
@@ -9850,7 +9855,7 @@
               </a:ln>
               <a:extLst>
                 <a:ext uri="{91240B29-F687-4f45-9708-019B960494DF}">
-                  <a14:hiddenLine xmlns:a14="http://schemas.microsoft.com/office/drawing/2010/main" xmlns="" w="9525">
+                  <a14:hiddenLine xmlns="" xmlns:a14="http://schemas.microsoft.com/office/drawing/2010/main" w="9525">
                     <a:solidFill>
                       <a:srgbClr val="000000"/>
                     </a:solidFill>
@@ -9934,7 +9939,7 @@
               </a:ln>
               <a:extLst>
                 <a:ext uri="{91240B29-F687-4f45-9708-019B960494DF}">
-                  <a14:hiddenLine xmlns:a14="http://schemas.microsoft.com/office/drawing/2010/main" xmlns="" w="9525">
+                  <a14:hiddenLine xmlns="" xmlns:a14="http://schemas.microsoft.com/office/drawing/2010/main" w="9525">
                     <a:solidFill>
                       <a:srgbClr val="000000"/>
                     </a:solidFill>
@@ -9996,7 +10001,7 @@
               </a:ln>
               <a:extLst>
                 <a:ext uri="{91240B29-F687-4f45-9708-019B960494DF}">
-                  <a14:hiddenLine xmlns:a14="http://schemas.microsoft.com/office/drawing/2010/main" xmlns="" w="9525">
+                  <a14:hiddenLine xmlns="" xmlns:a14="http://schemas.microsoft.com/office/drawing/2010/main" w="9525">
                     <a:solidFill>
                       <a:srgbClr val="000000"/>
                     </a:solidFill>
@@ -10058,7 +10063,7 @@
               </a:ln>
               <a:extLst>
                 <a:ext uri="{91240B29-F687-4f45-9708-019B960494DF}">
-                  <a14:hiddenLine xmlns:a14="http://schemas.microsoft.com/office/drawing/2010/main" xmlns="" w="9525">
+                  <a14:hiddenLine xmlns="" xmlns:a14="http://schemas.microsoft.com/office/drawing/2010/main" w="9525">
                     <a:solidFill>
                       <a:srgbClr val="000000"/>
                     </a:solidFill>
@@ -10148,7 +10153,7 @@
               </a:ln>
               <a:extLst>
                 <a:ext uri="{91240B29-F687-4f45-9708-019B960494DF}">
-                  <a14:hiddenLine xmlns:a14="http://schemas.microsoft.com/office/drawing/2010/main" xmlns="" w="9525">
+                  <a14:hiddenLine xmlns="" xmlns:a14="http://schemas.microsoft.com/office/drawing/2010/main" w="9525">
                     <a:solidFill>
                       <a:srgbClr val="000000"/>
                     </a:solidFill>
@@ -10182,7 +10187,7 @@
               </a:ln>
               <a:extLst>
                 <a:ext uri="{91240B29-F687-4f45-9708-019B960494DF}">
-                  <a14:hiddenLine xmlns:a14="http://schemas.microsoft.com/office/drawing/2010/main" xmlns="" w="9525">
+                  <a14:hiddenLine xmlns="" xmlns:a14="http://schemas.microsoft.com/office/drawing/2010/main" w="9525">
                     <a:solidFill>
                       <a:srgbClr val="000000"/>
                     </a:solidFill>
@@ -10247,7 +10252,7 @@
               </a:ln>
               <a:extLst>
                 <a:ext uri="{91240B29-F687-4f45-9708-019B960494DF}">
-                  <a14:hiddenLine xmlns:a14="http://schemas.microsoft.com/office/drawing/2010/main" xmlns="" w="9525">
+                  <a14:hiddenLine xmlns="" xmlns:a14="http://schemas.microsoft.com/office/drawing/2010/main" w="9525">
                     <a:solidFill>
                       <a:srgbClr val="000000"/>
                     </a:solidFill>
@@ -10337,7 +10342,7 @@
               </a:ln>
               <a:extLst>
                 <a:ext uri="{91240B29-F687-4f45-9708-019B960494DF}">
-                  <a14:hiddenLine xmlns:a14="http://schemas.microsoft.com/office/drawing/2010/main" xmlns="" w="9525">
+                  <a14:hiddenLine xmlns="" xmlns:a14="http://schemas.microsoft.com/office/drawing/2010/main" w="9525">
                     <a:solidFill>
                       <a:srgbClr val="000000"/>
                     </a:solidFill>
@@ -10399,7 +10404,7 @@
               </a:ln>
               <a:extLst>
                 <a:ext uri="{91240B29-F687-4f45-9708-019B960494DF}">
-                  <a14:hiddenLine xmlns:a14="http://schemas.microsoft.com/office/drawing/2010/main" xmlns="" w="9525">
+                  <a14:hiddenLine xmlns="" xmlns:a14="http://schemas.microsoft.com/office/drawing/2010/main" w="9525">
                     <a:solidFill>
                       <a:srgbClr val="000000"/>
                     </a:solidFill>
@@ -10489,7 +10494,7 @@
               </a:ln>
               <a:extLst>
                 <a:ext uri="{91240B29-F687-4f45-9708-019B960494DF}">
-                  <a14:hiddenLine xmlns:a14="http://schemas.microsoft.com/office/drawing/2010/main" xmlns="" w="9525">
+                  <a14:hiddenLine xmlns="" xmlns:a14="http://schemas.microsoft.com/office/drawing/2010/main" w="9525">
                     <a:solidFill>
                       <a:srgbClr val="000000"/>
                     </a:solidFill>
@@ -10554,7 +10559,7 @@
               </a:ln>
               <a:extLst>
                 <a:ext uri="{91240B29-F687-4f45-9708-019B960494DF}">
-                  <a14:hiddenLine xmlns:a14="http://schemas.microsoft.com/office/drawing/2010/main" xmlns="" w="9525">
+                  <a14:hiddenLine xmlns="" xmlns:a14="http://schemas.microsoft.com/office/drawing/2010/main" w="9525">
                     <a:solidFill>
                       <a:srgbClr val="000000"/>
                     </a:solidFill>
@@ -10616,7 +10621,7 @@
               </a:ln>
               <a:extLst>
                 <a:ext uri="{91240B29-F687-4f45-9708-019B960494DF}">
-                  <a14:hiddenLine xmlns:a14="http://schemas.microsoft.com/office/drawing/2010/main" xmlns="" w="9525">
+                  <a14:hiddenLine xmlns="" xmlns:a14="http://schemas.microsoft.com/office/drawing/2010/main" w="9525">
                     <a:solidFill>
                       <a:srgbClr val="000000"/>
                     </a:solidFill>
@@ -10706,7 +10711,7 @@
               </a:ln>
               <a:extLst>
                 <a:ext uri="{91240B29-F687-4f45-9708-019B960494DF}">
-                  <a14:hiddenLine xmlns:a14="http://schemas.microsoft.com/office/drawing/2010/main" xmlns="" w="9525">
+                  <a14:hiddenLine xmlns="" xmlns:a14="http://schemas.microsoft.com/office/drawing/2010/main" w="9525">
                     <a:solidFill>
                       <a:srgbClr val="000000"/>
                     </a:solidFill>
@@ -10796,7 +10801,7 @@
               </a:ln>
               <a:extLst>
                 <a:ext uri="{91240B29-F687-4f45-9708-019B960494DF}">
-                  <a14:hiddenLine xmlns:a14="http://schemas.microsoft.com/office/drawing/2010/main" xmlns="" w="9525">
+                  <a14:hiddenLine xmlns="" xmlns:a14="http://schemas.microsoft.com/office/drawing/2010/main" w="9525">
                     <a:solidFill>
                       <a:srgbClr val="000000"/>
                     </a:solidFill>
@@ -10861,7 +10866,7 @@
               </a:ln>
               <a:extLst>
                 <a:ext uri="{91240B29-F687-4f45-9708-019B960494DF}">
-                  <a14:hiddenLine xmlns:a14="http://schemas.microsoft.com/office/drawing/2010/main" xmlns="" w="9525">
+                  <a14:hiddenLine xmlns="" xmlns:a14="http://schemas.microsoft.com/office/drawing/2010/main" w="9525">
                     <a:solidFill>
                       <a:srgbClr val="000000"/>
                     </a:solidFill>
@@ -10981,7 +10986,7 @@
               </a:ln>
               <a:extLst>
                 <a:ext uri="{91240B29-F687-4f45-9708-019B960494DF}">
-                  <a14:hiddenLine xmlns:a14="http://schemas.microsoft.com/office/drawing/2010/main" xmlns="" w="9525">
+                  <a14:hiddenLine xmlns="" xmlns:a14="http://schemas.microsoft.com/office/drawing/2010/main" w="9525">
                     <a:solidFill>
                       <a:srgbClr val="000000"/>
                     </a:solidFill>
@@ -11079,7 +11084,7 @@
               </a:ln>
               <a:extLst>
                 <a:ext uri="{91240B29-F687-4f45-9708-019B960494DF}">
-                  <a14:hiddenLine xmlns:a14="http://schemas.microsoft.com/office/drawing/2010/main" xmlns="" w="9525">
+                  <a14:hiddenLine xmlns="" xmlns:a14="http://schemas.microsoft.com/office/drawing/2010/main" w="9525">
                     <a:solidFill>
                       <a:srgbClr val="000000"/>
                     </a:solidFill>
@@ -11194,7 +11199,7 @@
               </a:ln>
               <a:extLst>
                 <a:ext uri="{91240B29-F687-4f45-9708-019B960494DF}">
-                  <a14:hiddenLine xmlns:a14="http://schemas.microsoft.com/office/drawing/2010/main" xmlns="" w="9525">
+                  <a14:hiddenLine xmlns="" xmlns:a14="http://schemas.microsoft.com/office/drawing/2010/main" w="9525">
                     <a:solidFill>
                       <a:srgbClr val="000000"/>
                     </a:solidFill>
@@ -11284,7 +11289,7 @@
               </a:ln>
               <a:extLst>
                 <a:ext uri="{91240B29-F687-4f45-9708-019B960494DF}">
-                  <a14:hiddenLine xmlns:a14="http://schemas.microsoft.com/office/drawing/2010/main" xmlns="" w="9525">
+                  <a14:hiddenLine xmlns="" xmlns:a14="http://schemas.microsoft.com/office/drawing/2010/main" w="9525">
                     <a:solidFill>
                       <a:srgbClr val="000000"/>
                     </a:solidFill>
@@ -11349,7 +11354,7 @@
               </a:ln>
               <a:extLst>
                 <a:ext uri="{91240B29-F687-4f45-9708-019B960494DF}">
-                  <a14:hiddenLine xmlns:a14="http://schemas.microsoft.com/office/drawing/2010/main" xmlns="" w="9525">
+                  <a14:hiddenLine xmlns="" xmlns:a14="http://schemas.microsoft.com/office/drawing/2010/main" w="9525">
                     <a:solidFill>
                       <a:srgbClr val="000000"/>
                     </a:solidFill>
@@ -11439,7 +11444,7 @@
               </a:ln>
               <a:extLst>
                 <a:ext uri="{91240B29-F687-4f45-9708-019B960494DF}">
-                  <a14:hiddenLine xmlns:a14="http://schemas.microsoft.com/office/drawing/2010/main" xmlns="" w="9525">
+                  <a14:hiddenLine xmlns="" xmlns:a14="http://schemas.microsoft.com/office/drawing/2010/main" w="9525">
                     <a:solidFill>
                       <a:srgbClr val="000000"/>
                     </a:solidFill>
@@ -11507,7 +11512,7 @@
               </a:ln>
               <a:extLst>
                 <a:ext uri="{91240B29-F687-4f45-9708-019B960494DF}">
-                  <a14:hiddenLine xmlns:a14="http://schemas.microsoft.com/office/drawing/2010/main" xmlns="" w="9525">
+                  <a14:hiddenLine xmlns="" xmlns:a14="http://schemas.microsoft.com/office/drawing/2010/main" w="9525">
                     <a:solidFill>
                       <a:srgbClr val="000000"/>
                     </a:solidFill>
@@ -11597,7 +11602,7 @@
               </a:ln>
               <a:extLst>
                 <a:ext uri="{91240B29-F687-4f45-9708-019B960494DF}">
-                  <a14:hiddenLine xmlns:a14="http://schemas.microsoft.com/office/drawing/2010/main" xmlns="" w="9525">
+                  <a14:hiddenLine xmlns="" xmlns:a14="http://schemas.microsoft.com/office/drawing/2010/main" w="9525">
                     <a:solidFill>
                       <a:srgbClr val="000000"/>
                     </a:solidFill>
@@ -11665,7 +11670,7 @@
               </a:ln>
               <a:extLst>
                 <a:ext uri="{91240B29-F687-4f45-9708-019B960494DF}">
-                  <a14:hiddenLine xmlns:a14="http://schemas.microsoft.com/office/drawing/2010/main" xmlns="" w="9525">
+                  <a14:hiddenLine xmlns="" xmlns:a14="http://schemas.microsoft.com/office/drawing/2010/main" w="9525">
                     <a:solidFill>
                       <a:srgbClr val="000000"/>
                     </a:solidFill>
@@ -11755,7 +11760,7 @@
               </a:ln>
               <a:extLst>
                 <a:ext uri="{91240B29-F687-4f45-9708-019B960494DF}">
-                  <a14:hiddenLine xmlns:a14="http://schemas.microsoft.com/office/drawing/2010/main" xmlns="" w="9525">
+                  <a14:hiddenLine xmlns="" xmlns:a14="http://schemas.microsoft.com/office/drawing/2010/main" w="9525">
                     <a:solidFill>
                       <a:srgbClr val="000000"/>
                     </a:solidFill>
@@ -11789,7 +11794,7 @@
               </a:ln>
               <a:extLst>
                 <a:ext uri="{91240B29-F687-4f45-9708-019B960494DF}">
-                  <a14:hiddenLine xmlns:a14="http://schemas.microsoft.com/office/drawing/2010/main" xmlns="" w="9525">
+                  <a14:hiddenLine xmlns="" xmlns:a14="http://schemas.microsoft.com/office/drawing/2010/main" w="9525">
                     <a:solidFill>
                       <a:srgbClr val="000000"/>
                     </a:solidFill>
@@ -12949,8 +12954,13 @@
           <a:p>
             <a:r>
               <a:rPr lang="en-US" sz="1400" dirty="0"/>
-              <a:t>I use this ‘six-pack’ board as a ‘LEGO’ brick for Arduino projects using the NANO</a:t>
+              <a:t>I use this ‘six-pack’ board as a ‘LEGO’ brick for Arduino projects using </a:t>
             </a:r>
+            <a:r>
+              <a:rPr lang="en-US" sz="1400"/>
+              <a:t>the NANO.</a:t>
+            </a:r>
+            <a:endParaRPr lang="en-US" sz="1400" dirty="0"/>
           </a:p>
         </p:txBody>
       </p:sp>

</xml_diff>

<commit_message>
Revisions for Part 2
Updated to reflect experience from Part 1 and also any comments received on the Part 2/first draft.
</commit_message>
<xml_diff>
--- a/Practical Arduino - Ground Up.pptx
+++ b/Practical Arduino - Ground Up.pptx
@@ -12,7 +12,9 @@
     <p:sldId id="261" r:id="rId6"/>
     <p:sldId id="262" r:id="rId7"/>
     <p:sldId id="264" r:id="rId8"/>
-    <p:sldId id="263" r:id="rId9"/>
+    <p:sldId id="265" r:id="rId9"/>
+    <p:sldId id="266" r:id="rId10"/>
+    <p:sldId id="263" r:id="rId11"/>
   </p:sldIdLst>
   <p:sldSz cx="12192000" cy="6858000"/>
   <p:notesSz cx="6858000" cy="9144000"/>
@@ -4395,7 +4397,7 @@
           <a:p>
             <a:fld id="{48A87A34-81AB-432B-8DAE-1953F412C126}" type="datetimeFigureOut">
               <a:rPr lang="en-US" dirty="0"/>
-              <a:t>1/9/2022</a:t>
+              <a:t>1/12/2022</a:t>
             </a:fld>
             <a:endParaRPr lang="en-US" dirty="0"/>
           </a:p>
@@ -4657,7 +4659,7 @@
           <a:p>
             <a:fld id="{48A87A34-81AB-432B-8DAE-1953F412C126}" type="datetimeFigureOut">
               <a:rPr lang="en-US" dirty="0"/>
-              <a:t>1/9/2022</a:t>
+              <a:t>1/12/2022</a:t>
             </a:fld>
             <a:endParaRPr lang="en-US" dirty="0"/>
           </a:p>
@@ -4848,7 +4850,7 @@
           <a:p>
             <a:fld id="{48A87A34-81AB-432B-8DAE-1953F412C126}" type="datetimeFigureOut">
               <a:rPr lang="en-US" dirty="0"/>
-              <a:t>1/9/2022</a:t>
+              <a:t>1/12/2022</a:t>
             </a:fld>
             <a:endParaRPr lang="en-US" dirty="0"/>
           </a:p>
@@ -5106,7 +5108,7 @@
           <a:p>
             <a:fld id="{48A87A34-81AB-432B-8DAE-1953F412C126}" type="datetimeFigureOut">
               <a:rPr lang="en-US" dirty="0"/>
-              <a:t>1/9/2022</a:t>
+              <a:t>1/12/2022</a:t>
             </a:fld>
             <a:endParaRPr lang="en-US" dirty="0"/>
           </a:p>
@@ -5535,7 +5537,7 @@
           <a:p>
             <a:fld id="{48A87A34-81AB-432B-8DAE-1953F412C126}" type="datetimeFigureOut">
               <a:rPr lang="en-US" dirty="0"/>
-              <a:t>1/9/2022</a:t>
+              <a:t>1/12/2022</a:t>
             </a:fld>
             <a:endParaRPr lang="en-US" dirty="0"/>
           </a:p>
@@ -6076,7 +6078,7 @@
           <a:p>
             <a:fld id="{48A87A34-81AB-432B-8DAE-1953F412C126}" type="datetimeFigureOut">
               <a:rPr lang="en-US" dirty="0"/>
-              <a:t>1/9/2022</a:t>
+              <a:t>1/12/2022</a:t>
             </a:fld>
             <a:endParaRPr lang="en-US" dirty="0"/>
           </a:p>
@@ -6791,7 +6793,7 @@
           <a:p>
             <a:fld id="{48A87A34-81AB-432B-8DAE-1953F412C126}" type="datetimeFigureOut">
               <a:rPr lang="en-US" dirty="0"/>
-              <a:t>1/9/2022</a:t>
+              <a:t>1/12/2022</a:t>
             </a:fld>
             <a:endParaRPr lang="en-US" dirty="0"/>
           </a:p>
@@ -6956,7 +6958,7 @@
           <a:p>
             <a:fld id="{48A87A34-81AB-432B-8DAE-1953F412C126}" type="datetimeFigureOut">
               <a:rPr lang="en-US" dirty="0"/>
-              <a:t>1/9/2022</a:t>
+              <a:t>1/12/2022</a:t>
             </a:fld>
             <a:endParaRPr lang="en-US" dirty="0"/>
           </a:p>
@@ -7131,7 +7133,7 @@
           <a:p>
             <a:fld id="{48A87A34-81AB-432B-8DAE-1953F412C126}" type="datetimeFigureOut">
               <a:rPr lang="en-US" dirty="0"/>
-              <a:t>1/9/2022</a:t>
+              <a:t>1/12/2022</a:t>
             </a:fld>
             <a:endParaRPr lang="en-US" dirty="0"/>
           </a:p>
@@ -7296,7 +7298,7 @@
           <a:p>
             <a:fld id="{48A87A34-81AB-432B-8DAE-1953F412C126}" type="datetimeFigureOut">
               <a:rPr lang="en-US" dirty="0"/>
-              <a:t>1/9/2022</a:t>
+              <a:t>1/12/2022</a:t>
             </a:fld>
             <a:endParaRPr lang="en-US" dirty="0"/>
           </a:p>
@@ -7541,7 +7543,7 @@
           <a:p>
             <a:fld id="{48A87A34-81AB-432B-8DAE-1953F412C126}" type="datetimeFigureOut">
               <a:rPr lang="en-US" dirty="0"/>
-              <a:t>1/9/2022</a:t>
+              <a:t>1/12/2022</a:t>
             </a:fld>
             <a:endParaRPr lang="en-US" dirty="0"/>
           </a:p>
@@ -7768,7 +7770,7 @@
           <a:p>
             <a:fld id="{48A87A34-81AB-432B-8DAE-1953F412C126}" type="datetimeFigureOut">
               <a:rPr lang="en-US" dirty="0"/>
-              <a:t>1/9/2022</a:t>
+              <a:t>1/12/2022</a:t>
             </a:fld>
             <a:endParaRPr lang="en-US" dirty="0"/>
           </a:p>
@@ -8144,7 +8146,7 @@
           <a:p>
             <a:fld id="{48A87A34-81AB-432B-8DAE-1953F412C126}" type="datetimeFigureOut">
               <a:rPr lang="en-US" dirty="0"/>
-              <a:t>1/9/2022</a:t>
+              <a:t>1/12/2022</a:t>
             </a:fld>
             <a:endParaRPr lang="en-US" dirty="0"/>
           </a:p>
@@ -8257,7 +8259,7 @@
           <a:p>
             <a:fld id="{48A87A34-81AB-432B-8DAE-1953F412C126}" type="datetimeFigureOut">
               <a:rPr lang="en-US" dirty="0"/>
-              <a:t>1/9/2022</a:t>
+              <a:t>1/12/2022</a:t>
             </a:fld>
             <a:endParaRPr lang="en-US" dirty="0"/>
           </a:p>
@@ -8347,7 +8349,7 @@
           <a:p>
             <a:fld id="{48A87A34-81AB-432B-8DAE-1953F412C126}" type="datetimeFigureOut">
               <a:rPr lang="en-US" dirty="0"/>
-              <a:t>1/9/2022</a:t>
+              <a:t>1/12/2022</a:t>
             </a:fld>
             <a:endParaRPr lang="en-US" dirty="0"/>
           </a:p>
@@ -8591,7 +8593,7 @@
           <a:p>
             <a:fld id="{48A87A34-81AB-432B-8DAE-1953F412C126}" type="datetimeFigureOut">
               <a:rPr lang="en-US" dirty="0"/>
-              <a:t>1/9/2022</a:t>
+              <a:t>1/12/2022</a:t>
             </a:fld>
             <a:endParaRPr lang="en-US" dirty="0"/>
           </a:p>
@@ -8866,7 +8868,7 @@
           <a:p>
             <a:fld id="{48A87A34-81AB-432B-8DAE-1953F412C126}" type="datetimeFigureOut">
               <a:rPr lang="en-US" dirty="0"/>
-              <a:t>1/9/2022</a:t>
+              <a:t>1/12/2022</a:t>
             </a:fld>
             <a:endParaRPr lang="en-US" dirty="0"/>
           </a:p>
@@ -11939,7 +11941,7 @@
             <a:fld id="{48A87A34-81AB-432B-8DAE-1953F412C126}" type="datetimeFigureOut">
               <a:rPr lang="en-US" dirty="0"/>
               <a:pPr/>
-              <a:t>1/9/2022</a:t>
+              <a:t>1/12/2022</a:t>
             </a:fld>
             <a:endParaRPr lang="en-US" dirty="0"/>
           </a:p>
@@ -12454,6 +12456,216 @@
 </p:sld>
 </file>
 
+<file path=ppt/slides/slide10.xml><?xml version="1.0" encoding="utf-8"?>
+<p:sld xmlns:a="http://schemas.openxmlformats.org/drawingml/2006/main" xmlns:r="http://schemas.openxmlformats.org/officeDocument/2006/relationships" xmlns:p="http://schemas.openxmlformats.org/presentationml/2006/main">
+  <p:cSld>
+    <p:spTree>
+      <p:nvGrpSpPr>
+        <p:cNvPr id="1" name=""/>
+        <p:cNvGrpSpPr/>
+        <p:nvPr/>
+      </p:nvGrpSpPr>
+      <p:grpSpPr>
+        <a:xfrm>
+          <a:off x="0" y="0"/>
+          <a:ext cx="0" cy="0"/>
+          <a:chOff x="0" y="0"/>
+          <a:chExt cx="0" cy="0"/>
+        </a:xfrm>
+      </p:grpSpPr>
+      <p:sp>
+        <p:nvSpPr>
+          <p:cNvPr id="2" name="Title 1">
+            <a:extLst>
+              <a:ext uri="{FF2B5EF4-FFF2-40B4-BE49-F238E27FC236}">
+                <a16:creationId xmlns:a16="http://schemas.microsoft.com/office/drawing/2014/main" id="{68C3ECC6-4864-4365-A835-A7F076D4DB5C}"/>
+              </a:ext>
+            </a:extLst>
+          </p:cNvPr>
+          <p:cNvSpPr>
+            <a:spLocks noGrp="1"/>
+          </p:cNvSpPr>
+          <p:nvPr>
+            <p:ph type="title"/>
+          </p:nvPr>
+        </p:nvSpPr>
+        <p:spPr>
+          <a:xfrm>
+            <a:off x="1141413" y="618518"/>
+            <a:ext cx="9905998" cy="757276"/>
+          </a:xfrm>
+        </p:spPr>
+        <p:txBody>
+          <a:bodyPr/>
+          <a:lstStyle/>
+          <a:p>
+            <a:r>
+              <a:rPr lang="en-US" dirty="0"/>
+              <a:t>Links and Resources</a:t>
+            </a:r>
+          </a:p>
+        </p:txBody>
+      </p:sp>
+      <p:sp>
+        <p:nvSpPr>
+          <p:cNvPr id="5" name="TextBox 4">
+            <a:extLst>
+              <a:ext uri="{FF2B5EF4-FFF2-40B4-BE49-F238E27FC236}">
+                <a16:creationId xmlns:a16="http://schemas.microsoft.com/office/drawing/2014/main" id="{CBC3A85E-3C37-49F2-B111-0FDD48922253}"/>
+              </a:ext>
+            </a:extLst>
+          </p:cNvPr>
+          <p:cNvSpPr txBox="1"/>
+          <p:nvPr/>
+        </p:nvSpPr>
+        <p:spPr>
+          <a:xfrm>
+            <a:off x="1141412" y="1505634"/>
+            <a:ext cx="10494117" cy="369332"/>
+          </a:xfrm>
+          <a:prstGeom prst="rect">
+            <a:avLst/>
+          </a:prstGeom>
+          <a:noFill/>
+        </p:spPr>
+        <p:txBody>
+          <a:bodyPr wrap="square">
+            <a:spAutoFit/>
+          </a:bodyPr>
+          <a:lstStyle/>
+          <a:p>
+            <a:r>
+              <a:rPr lang="en-US" dirty="0"/>
+              <a:t>https://rudysarduinoprojects.wordpress.com/2019/05/06/fun-with-arduino-29-dcc-accessory-decoder/</a:t>
+            </a:r>
+          </a:p>
+        </p:txBody>
+      </p:sp>
+      <p:pic>
+        <p:nvPicPr>
+          <p:cNvPr id="7" name="Picture 6">
+            <a:extLst>
+              <a:ext uri="{FF2B5EF4-FFF2-40B4-BE49-F238E27FC236}">
+                <a16:creationId xmlns:a16="http://schemas.microsoft.com/office/drawing/2014/main" id="{F02E83F8-9451-4E9D-90DD-198D15EA2BE1}"/>
+              </a:ext>
+            </a:extLst>
+          </p:cNvPr>
+          <p:cNvPicPr>
+            <a:picLocks noChangeAspect="1"/>
+          </p:cNvPicPr>
+          <p:nvPr/>
+        </p:nvPicPr>
+        <p:blipFill>
+          <a:blip r:embed="rId2"/>
+          <a:stretch>
+            <a:fillRect/>
+          </a:stretch>
+        </p:blipFill>
+        <p:spPr>
+          <a:xfrm>
+            <a:off x="1230298" y="1909115"/>
+            <a:ext cx="3207478" cy="1046131"/>
+          </a:xfrm>
+          <a:prstGeom prst="rect">
+            <a:avLst/>
+          </a:prstGeom>
+        </p:spPr>
+      </p:pic>
+      <p:sp>
+        <p:nvSpPr>
+          <p:cNvPr id="9" name="TextBox 8">
+            <a:extLst>
+              <a:ext uri="{FF2B5EF4-FFF2-40B4-BE49-F238E27FC236}">
+                <a16:creationId xmlns:a16="http://schemas.microsoft.com/office/drawing/2014/main" id="{475CF317-0BD7-4A39-A278-3EF77E1FFAB9}"/>
+              </a:ext>
+            </a:extLst>
+          </p:cNvPr>
+          <p:cNvSpPr txBox="1"/>
+          <p:nvPr/>
+        </p:nvSpPr>
+        <p:spPr>
+          <a:xfrm>
+            <a:off x="324287" y="3993052"/>
+            <a:ext cx="6102990" cy="369332"/>
+          </a:xfrm>
+          <a:prstGeom prst="rect">
+            <a:avLst/>
+          </a:prstGeom>
+          <a:noFill/>
+        </p:spPr>
+        <p:txBody>
+          <a:bodyPr wrap="square">
+            <a:spAutoFit/>
+          </a:bodyPr>
+          <a:lstStyle/>
+          <a:p>
+            <a:r>
+              <a:rPr lang="en-US" dirty="0"/>
+              <a:t>http://trainelectronics.com/DCC_Arduino/index.htm</a:t>
+            </a:r>
+          </a:p>
+        </p:txBody>
+      </p:sp>
+      <p:pic>
+        <p:nvPicPr>
+          <p:cNvPr id="1026" name="Picture 2">
+            <a:extLst>
+              <a:ext uri="{FF2B5EF4-FFF2-40B4-BE49-F238E27FC236}">
+                <a16:creationId xmlns:a16="http://schemas.microsoft.com/office/drawing/2014/main" id="{AA7CB4F8-2EB6-43EC-9D99-BA507B9E00AF}"/>
+              </a:ext>
+            </a:extLst>
+          </p:cNvPr>
+          <p:cNvPicPr>
+            <a:picLocks noChangeAspect="1" noChangeArrowheads="1"/>
+          </p:cNvPicPr>
+          <p:nvPr/>
+        </p:nvPicPr>
+        <p:blipFill>
+          <a:blip r:embed="rId3">
+            <a:extLst>
+              <a:ext uri="{28A0092B-C50C-407E-A947-70E740481C1C}">
+                <a14:useLocalDpi xmlns:a14="http://schemas.microsoft.com/office/drawing/2010/main" val="0"/>
+              </a:ext>
+            </a:extLst>
+          </a:blip>
+          <a:srcRect/>
+          <a:stretch>
+            <a:fillRect/>
+          </a:stretch>
+        </p:blipFill>
+        <p:spPr bwMode="auto">
+          <a:xfrm>
+            <a:off x="5343787" y="2527871"/>
+            <a:ext cx="5832632" cy="4074265"/>
+          </a:xfrm>
+          <a:prstGeom prst="rect">
+            <a:avLst/>
+          </a:prstGeom>
+          <a:noFill/>
+          <a:extLst>
+            <a:ext uri="{909E8E84-426E-40DD-AFC4-6F175D3DCCD1}">
+              <a14:hiddenFill xmlns:a14="http://schemas.microsoft.com/office/drawing/2010/main">
+                <a:solidFill>
+                  <a:srgbClr val="FFFFFF"/>
+                </a:solidFill>
+              </a14:hiddenFill>
+            </a:ext>
+          </a:extLst>
+        </p:spPr>
+      </p:pic>
+    </p:spTree>
+    <p:extLst>
+      <p:ext uri="{BB962C8B-B14F-4D97-AF65-F5344CB8AC3E}">
+        <p14:creationId xmlns:p14="http://schemas.microsoft.com/office/powerpoint/2010/main" val="3443242970"/>
+      </p:ext>
+    </p:extLst>
+  </p:cSld>
+  <p:clrMapOvr>
+    <a:masterClrMapping/>
+  </p:clrMapOvr>
+</p:sld>
+</file>
+
 <file path=ppt/slides/slide2.xml><?xml version="1.0" encoding="utf-8"?>
 <p:sld xmlns:a="http://schemas.openxmlformats.org/drawingml/2006/main" xmlns:r="http://schemas.openxmlformats.org/officeDocument/2006/relationships" xmlns:p="http://schemas.openxmlformats.org/presentationml/2006/main">
   <p:cSld>
@@ -12501,7 +12713,7 @@
           <a:p>
             <a:r>
               <a:rPr lang="en-US" dirty="0"/>
-              <a:t>Outline </a:t>
+              <a:t>Potential Course Outline </a:t>
             </a:r>
             <a:r>
               <a:rPr lang="en-US" sz="1200" dirty="0">
@@ -13902,7 +14114,33 @@
             </a:pPr>
             <a:r>
               <a:rPr lang="en-US" sz="1400" dirty="0"/>
-              <a:t>On board regulation to 12 vdc at NANO Vin</a:t>
+              <a:t>On board regulation to 12 </a:t>
+            </a:r>
+            <a:r>
+              <a:rPr lang="en-US" sz="1400" dirty="0">
+                <a:solidFill>
+                  <a:schemeClr val="accent2">
+                    <a:lumMod val="60000"/>
+                    <a:lumOff val="40000"/>
+                  </a:schemeClr>
+                </a:solidFill>
+              </a:rPr>
+              <a:t>(5Vdc) </a:t>
+            </a:r>
+            <a:r>
+              <a:rPr lang="en-US" sz="1400" dirty="0"/>
+              <a:t>at NANO Vin </a:t>
+            </a:r>
+            <a:r>
+              <a:rPr lang="en-US" sz="1400" dirty="0">
+                <a:solidFill>
+                  <a:schemeClr val="accent2">
+                    <a:lumMod val="60000"/>
+                    <a:lumOff val="40000"/>
+                  </a:schemeClr>
+                </a:solidFill>
+              </a:rPr>
+              <a:t>(See later comments )</a:t>
             </a:r>
           </a:p>
           <a:p>
@@ -14353,7 +14591,7 @@
             </a:pPr>
             <a:r>
               <a:rPr lang="en-US" sz="1400" dirty="0"/>
-              <a:t>(OR 5 volts direct to Arduino)</a:t>
+              <a:t>On board regulation to 12 vdc at NANO Vin</a:t>
             </a:r>
           </a:p>
           <a:p>
@@ -14362,8 +14600,15 @@
               <a:buChar char="•"/>
             </a:pPr>
             <a:r>
-              <a:rPr lang="en-US" sz="1400" dirty="0"/>
-              <a:t>On board regulation to 12 vdc at NANO Vin</a:t>
+              <a:rPr lang="en-US" sz="1400" dirty="0">
+                <a:solidFill>
+                  <a:schemeClr val="accent2">
+                    <a:lumMod val="60000"/>
+                    <a:lumOff val="40000"/>
+                  </a:schemeClr>
+                </a:solidFill>
+              </a:rPr>
+              <a:t>(Or Regulated 5 vdc direct to Arduino)</a:t>
             </a:r>
           </a:p>
           <a:p>
@@ -14998,7 +15243,7 @@
         <p:spPr>
           <a:xfrm>
             <a:off x="4468189" y="1428948"/>
-            <a:ext cx="7595179" cy="3016210"/>
+            <a:ext cx="7595179" cy="3662541"/>
           </a:xfrm>
           <a:prstGeom prst="rect">
             <a:avLst/>
@@ -15131,6 +15376,23 @@
               <a:rPr lang="en-US" sz="1400" dirty="0"/>
               <a:t> ‘daughter board’ (MP3 sound effects) could be added.</a:t>
             </a:r>
+          </a:p>
+          <a:p>
+            <a:pPr marL="285750" indent="-285750">
+              <a:buFont typeface="Arial" panose="020B0604020202020204" pitchFamily="34" charset="0"/>
+              <a:buChar char="•"/>
+            </a:pPr>
+            <a:r>
+              <a:rPr lang="en-US" sz="1400" dirty="0"/>
+              <a:t>A row of holes where a max485 ‘daughter board’ (CMRI interface) or general comm’s could be added.</a:t>
+            </a:r>
+          </a:p>
+          <a:p>
+            <a:pPr marL="285750" indent="-285750">
+              <a:buFont typeface="Arial" panose="020B0604020202020204" pitchFamily="34" charset="0"/>
+              <a:buChar char="•"/>
+            </a:pPr>
+            <a:endParaRPr lang="en-US" sz="1400" dirty="0"/>
           </a:p>
           <a:p>
             <a:pPr marL="285750" indent="-285750">
@@ -15249,7 +15511,7 @@
         </p:nvSpPr>
         <p:spPr>
           <a:xfrm>
-            <a:off x="1141413" y="618518"/>
+            <a:off x="1143001" y="159944"/>
             <a:ext cx="9905998" cy="757276"/>
           </a:xfrm>
         </p:spPr>
@@ -15258,9 +15520,28 @@
           <a:lstStyle/>
           <a:p>
             <a:r>
-              <a:rPr lang="en-US" dirty="0"/>
-              <a:t>Links and Resources</a:t>
-            </a:r>
+              <a:rPr lang="en-US" dirty="0">
+                <a:solidFill>
+                  <a:srgbClr val="00B050"/>
+                </a:solidFill>
+                <a:latin typeface="Checkbook" panose="020B0000000000000000" pitchFamily="34" charset="0"/>
+              </a:rPr>
+              <a:t>MERGduino: </a:t>
+            </a:r>
+            <a:r>
+              <a:rPr lang="en-US" dirty="0">
+                <a:solidFill>
+                  <a:srgbClr val="FF0000"/>
+                </a:solidFill>
+                <a:latin typeface="Checkbook" panose="020B0000000000000000" pitchFamily="34" charset="0"/>
+              </a:rPr>
+              <a:t>Work Phases</a:t>
+            </a:r>
+            <a:endParaRPr lang="en-US" dirty="0">
+              <a:solidFill>
+                <a:srgbClr val="FF0000"/>
+              </a:solidFill>
+            </a:endParaRPr>
           </a:p>
         </p:txBody>
       </p:sp>
@@ -15269,7 +15550,7 @@
           <p:cNvPr id="5" name="TextBox 4">
             <a:extLst>
               <a:ext uri="{FF2B5EF4-FFF2-40B4-BE49-F238E27FC236}">
-                <a16:creationId xmlns:a16="http://schemas.microsoft.com/office/drawing/2014/main" id="{CBC3A85E-3C37-49F2-B111-0FDD48922253}"/>
+                <a16:creationId xmlns:a16="http://schemas.microsoft.com/office/drawing/2014/main" id="{FFEC40BD-F54C-4EBC-AFDF-B49252F8875F}"/>
               </a:ext>
             </a:extLst>
           </p:cNvPr>
@@ -15278,8 +15559,8 @@
         </p:nvSpPr>
         <p:spPr>
           <a:xfrm>
-            <a:off x="1141412" y="1505634"/>
-            <a:ext cx="10494117" cy="369332"/>
+            <a:off x="1649489" y="850109"/>
+            <a:ext cx="7595179" cy="369332"/>
           </a:xfrm>
           <a:prstGeom prst="rect">
             <a:avLst/>
@@ -15287,54 +15568,755 @@
           <a:noFill/>
         </p:spPr>
         <p:txBody>
-          <a:bodyPr wrap="square">
+          <a:bodyPr wrap="square" rtlCol="0">
             <a:spAutoFit/>
           </a:bodyPr>
           <a:lstStyle/>
           <a:p>
             <a:r>
-              <a:rPr lang="en-US" dirty="0"/>
-              <a:t>https://rudysarduinoprojects.wordpress.com/2019/05/06/fun-with-arduino-29-dcc-accessory-decoder/</a:t>
+              <a:rPr lang="en-US" dirty="0">
+                <a:solidFill>
+                  <a:srgbClr val="FFFF00"/>
+                </a:solidFill>
+              </a:rPr>
+              <a:t>All Projects go through phases (whether they are recognized as such or not)</a:t>
             </a:r>
           </a:p>
         </p:txBody>
       </p:sp>
-      <p:pic>
-        <p:nvPicPr>
-          <p:cNvPr id="7" name="Picture 6">
+      <p:graphicFrame>
+        <p:nvGraphicFramePr>
+          <p:cNvPr id="3" name="Table 3">
             <a:extLst>
               <a:ext uri="{FF2B5EF4-FFF2-40B4-BE49-F238E27FC236}">
-                <a16:creationId xmlns:a16="http://schemas.microsoft.com/office/drawing/2014/main" id="{F02E83F8-9451-4E9D-90DD-198D15EA2BE1}"/>
+                <a16:creationId xmlns:a16="http://schemas.microsoft.com/office/drawing/2014/main" id="{A0507852-E66F-4053-BA5E-0427BC62CC37}"/>
               </a:ext>
             </a:extLst>
           </p:cNvPr>
-          <p:cNvPicPr>
-            <a:picLocks noChangeAspect="1"/>
-          </p:cNvPicPr>
-          <p:nvPr/>
-        </p:nvPicPr>
-        <p:blipFill>
-          <a:blip r:embed="rId2"/>
-          <a:stretch>
-            <a:fillRect/>
-          </a:stretch>
-        </p:blipFill>
-        <p:spPr>
-          <a:xfrm>
-            <a:off x="1230298" y="1909115"/>
-            <a:ext cx="3207478" cy="1046131"/>
-          </a:xfrm>
-          <a:prstGeom prst="rect">
-            <a:avLst/>
-          </a:prstGeom>
-        </p:spPr>
-      </p:pic>
+          <p:cNvGraphicFramePr>
+            <a:graphicFrameLocks noGrp="1"/>
+          </p:cNvGraphicFramePr>
+          <p:nvPr>
+            <p:extLst>
+              <p:ext uri="{D42A27DB-BD31-4B8C-83A1-F6EECF244321}">
+                <p14:modId xmlns:p14="http://schemas.microsoft.com/office/powerpoint/2010/main" val="3534783679"/>
+              </p:ext>
+            </p:extLst>
+          </p:nvPr>
+        </p:nvGraphicFramePr>
+        <p:xfrm>
+          <a:off x="916496" y="1709567"/>
+          <a:ext cx="10635144" cy="2966720"/>
+        </p:xfrm>
+        <a:graphic>
+          <a:graphicData uri="http://schemas.openxmlformats.org/drawingml/2006/table">
+            <a:tbl>
+              <a:tblPr firstRow="1" bandRow="1">
+                <a:tableStyleId>{5C22544A-7EE6-4342-B048-85BDC9FD1C3A}</a:tableStyleId>
+              </a:tblPr>
+              <a:tblGrid>
+                <a:gridCol w="817417">
+                  <a:extLst>
+                    <a:ext uri="{9D8B030D-6E8A-4147-A177-3AD203B41FA5}">
+                      <a16:colId xmlns:a16="http://schemas.microsoft.com/office/drawing/2014/main" val="2598000485"/>
+                    </a:ext>
+                  </a:extLst>
+                </a:gridCol>
+                <a:gridCol w="1655239">
+                  <a:extLst>
+                    <a:ext uri="{9D8B030D-6E8A-4147-A177-3AD203B41FA5}">
+                      <a16:colId xmlns:a16="http://schemas.microsoft.com/office/drawing/2014/main" val="3863070693"/>
+                    </a:ext>
+                  </a:extLst>
+                </a:gridCol>
+                <a:gridCol w="3816991">
+                  <a:extLst>
+                    <a:ext uri="{9D8B030D-6E8A-4147-A177-3AD203B41FA5}">
+                      <a16:colId xmlns:a16="http://schemas.microsoft.com/office/drawing/2014/main" val="429033357"/>
+                    </a:ext>
+                  </a:extLst>
+                </a:gridCol>
+                <a:gridCol w="2969703">
+                  <a:extLst>
+                    <a:ext uri="{9D8B030D-6E8A-4147-A177-3AD203B41FA5}">
+                      <a16:colId xmlns:a16="http://schemas.microsoft.com/office/drawing/2014/main" val="3983995983"/>
+                    </a:ext>
+                  </a:extLst>
+                </a:gridCol>
+                <a:gridCol w="1375794">
+                  <a:extLst>
+                    <a:ext uri="{9D8B030D-6E8A-4147-A177-3AD203B41FA5}">
+                      <a16:colId xmlns:a16="http://schemas.microsoft.com/office/drawing/2014/main" val="156959021"/>
+                    </a:ext>
+                  </a:extLst>
+                </a:gridCol>
+              </a:tblGrid>
+              <a:tr h="370840">
+                <a:tc>
+                  <a:txBody>
+                    <a:bodyPr/>
+                    <a:lstStyle/>
+                    <a:p>
+                      <a:pPr algn="ctr"/>
+                      <a:r>
+                        <a:rPr lang="en-US" dirty="0"/>
+                        <a:t>Phase</a:t>
+                      </a:r>
+                    </a:p>
+                  </a:txBody>
+                  <a:tcPr/>
+                </a:tc>
+                <a:tc>
+                  <a:txBody>
+                    <a:bodyPr/>
+                    <a:lstStyle/>
+                    <a:p>
+                      <a:r>
+                        <a:rPr lang="en-US" dirty="0"/>
+                        <a:t>Description</a:t>
+                      </a:r>
+                    </a:p>
+                  </a:txBody>
+                  <a:tcPr/>
+                </a:tc>
+                <a:tc>
+                  <a:txBody>
+                    <a:bodyPr/>
+                    <a:lstStyle/>
+                    <a:p>
+                      <a:r>
+                        <a:rPr lang="en-US" dirty="0"/>
+                        <a:t>Conditions for Going Forward</a:t>
+                      </a:r>
+                    </a:p>
+                  </a:txBody>
+                  <a:tcPr/>
+                </a:tc>
+                <a:tc>
+                  <a:txBody>
+                    <a:bodyPr/>
+                    <a:lstStyle/>
+                    <a:p>
+                      <a:r>
+                        <a:rPr lang="en-US" dirty="0"/>
+                        <a:t>Decision</a:t>
+                      </a:r>
+                    </a:p>
+                  </a:txBody>
+                  <a:tcPr/>
+                </a:tc>
+                <a:tc>
+                  <a:txBody>
+                    <a:bodyPr/>
+                    <a:lstStyle/>
+                    <a:p>
+                      <a:r>
+                        <a:rPr lang="en-US" dirty="0"/>
+                        <a:t>When</a:t>
+                      </a:r>
+                    </a:p>
+                  </a:txBody>
+                  <a:tcPr/>
+                </a:tc>
+                <a:extLst>
+                  <a:ext uri="{0D108BD9-81ED-4DB2-BD59-A6C34878D82A}">
+                    <a16:rowId xmlns:a16="http://schemas.microsoft.com/office/drawing/2014/main" val="2495785719"/>
+                  </a:ext>
+                </a:extLst>
+              </a:tr>
+              <a:tr h="370840">
+                <a:tc>
+                  <a:txBody>
+                    <a:bodyPr/>
+                    <a:lstStyle/>
+                    <a:p>
+                      <a:pPr algn="ctr"/>
+                      <a:r>
+                        <a:rPr lang="en-US" dirty="0"/>
+                        <a:t>0</a:t>
+                      </a:r>
+                    </a:p>
+                  </a:txBody>
+                  <a:tcPr/>
+                </a:tc>
+                <a:tc>
+                  <a:txBody>
+                    <a:bodyPr/>
+                    <a:lstStyle/>
+                    <a:p>
+                      <a:r>
+                        <a:rPr lang="en-US" dirty="0"/>
+                        <a:t>Idea</a:t>
+                      </a:r>
+                    </a:p>
+                  </a:txBody>
+                  <a:tcPr/>
+                </a:tc>
+                <a:tc>
+                  <a:txBody>
+                    <a:bodyPr/>
+                    <a:lstStyle/>
+                    <a:p>
+                      <a:r>
+                        <a:rPr lang="en-US" dirty="0"/>
+                        <a:t>Someone is willing to work it</a:t>
+                      </a:r>
+                    </a:p>
+                  </a:txBody>
+                  <a:tcPr/>
+                </a:tc>
+                <a:tc>
+                  <a:txBody>
+                    <a:bodyPr/>
+                    <a:lstStyle/>
+                    <a:p>
+                      <a:r>
+                        <a:rPr lang="en-US" dirty="0"/>
+                        <a:t>Yes – Alan</a:t>
+                      </a:r>
+                    </a:p>
+                  </a:txBody>
+                  <a:tcPr/>
+                </a:tc>
+                <a:tc>
+                  <a:txBody>
+                    <a:bodyPr/>
+                    <a:lstStyle/>
+                    <a:p>
+                      <a:r>
+                        <a:rPr lang="en-US" dirty="0"/>
+                        <a:t>Dec 2021</a:t>
+                      </a:r>
+                    </a:p>
+                  </a:txBody>
+                  <a:tcPr/>
+                </a:tc>
+                <a:extLst>
+                  <a:ext uri="{0D108BD9-81ED-4DB2-BD59-A6C34878D82A}">
+                    <a16:rowId xmlns:a16="http://schemas.microsoft.com/office/drawing/2014/main" val="3523431365"/>
+                  </a:ext>
+                </a:extLst>
+              </a:tr>
+              <a:tr h="370840">
+                <a:tc>
+                  <a:txBody>
+                    <a:bodyPr/>
+                    <a:lstStyle/>
+                    <a:p>
+                      <a:pPr algn="ctr"/>
+                      <a:r>
+                        <a:rPr lang="en-US" dirty="0"/>
+                        <a:t>1</a:t>
+                      </a:r>
+                    </a:p>
+                  </a:txBody>
+                  <a:tcPr/>
+                </a:tc>
+                <a:tc>
+                  <a:txBody>
+                    <a:bodyPr/>
+                    <a:lstStyle/>
+                    <a:p>
+                      <a:r>
+                        <a:rPr lang="en-US" dirty="0"/>
+                        <a:t>Definition</a:t>
+                      </a:r>
+                    </a:p>
+                  </a:txBody>
+                  <a:tcPr/>
+                </a:tc>
+                <a:tc>
+                  <a:txBody>
+                    <a:bodyPr/>
+                    <a:lstStyle/>
+                    <a:p>
+                      <a:pPr marL="0" marR="0" lvl="0" indent="0" algn="l" defTabSz="914400" rtl="0" eaLnBrk="1" fontAlgn="auto" latinLnBrk="0" hangingPunct="1">
+                        <a:lnSpc>
+                          <a:spcPct val="100000"/>
+                        </a:lnSpc>
+                        <a:spcBef>
+                          <a:spcPts val="0"/>
+                        </a:spcBef>
+                        <a:spcAft>
+                          <a:spcPts val="0"/>
+                        </a:spcAft>
+                        <a:buClrTx/>
+                        <a:buSzTx/>
+                        <a:buFontTx/>
+                        <a:buNone/>
+                        <a:tabLst/>
+                        <a:defRPr/>
+                      </a:pPr>
+                      <a:r>
+                        <a:rPr lang="en-US" dirty="0"/>
+                        <a:t>Requirements are set.</a:t>
+                      </a:r>
+                    </a:p>
+                  </a:txBody>
+                  <a:tcPr/>
+                </a:tc>
+                <a:tc>
+                  <a:txBody>
+                    <a:bodyPr/>
+                    <a:lstStyle/>
+                    <a:p>
+                      <a:r>
+                        <a:rPr lang="en-US" dirty="0"/>
+                        <a:t>This is In Progress</a:t>
+                      </a:r>
+                    </a:p>
+                  </a:txBody>
+                  <a:tcPr/>
+                </a:tc>
+                <a:tc>
+                  <a:txBody>
+                    <a:bodyPr/>
+                    <a:lstStyle/>
+                    <a:p>
+                      <a:r>
+                        <a:rPr lang="en-US" dirty="0"/>
+                        <a:t>Jan 2022</a:t>
+                      </a:r>
+                    </a:p>
+                  </a:txBody>
+                  <a:tcPr/>
+                </a:tc>
+                <a:extLst>
+                  <a:ext uri="{0D108BD9-81ED-4DB2-BD59-A6C34878D82A}">
+                    <a16:rowId xmlns:a16="http://schemas.microsoft.com/office/drawing/2014/main" val="513001465"/>
+                  </a:ext>
+                </a:extLst>
+              </a:tr>
+              <a:tr h="370840">
+                <a:tc>
+                  <a:txBody>
+                    <a:bodyPr/>
+                    <a:lstStyle/>
+                    <a:p>
+                      <a:pPr algn="ctr"/>
+                      <a:r>
+                        <a:rPr lang="en-US" dirty="0"/>
+                        <a:t>2</a:t>
+                      </a:r>
+                    </a:p>
+                  </a:txBody>
+                  <a:tcPr/>
+                </a:tc>
+                <a:tc>
+                  <a:txBody>
+                    <a:bodyPr/>
+                    <a:lstStyle/>
+                    <a:p>
+                      <a:r>
+                        <a:rPr lang="en-US" dirty="0"/>
+                        <a:t>Basic Design</a:t>
+                      </a:r>
+                    </a:p>
+                  </a:txBody>
+                  <a:tcPr/>
+                </a:tc>
+                <a:tc>
+                  <a:txBody>
+                    <a:bodyPr/>
+                    <a:lstStyle/>
+                    <a:p>
+                      <a:pPr marL="0" marR="0" lvl="0" indent="0" algn="l" defTabSz="914400" rtl="0" eaLnBrk="1" fontAlgn="auto" latinLnBrk="0" hangingPunct="1">
+                        <a:lnSpc>
+                          <a:spcPct val="100000"/>
+                        </a:lnSpc>
+                        <a:spcBef>
+                          <a:spcPts val="0"/>
+                        </a:spcBef>
+                        <a:spcAft>
+                          <a:spcPts val="0"/>
+                        </a:spcAft>
+                        <a:buClrTx/>
+                        <a:buSzTx/>
+                        <a:buFontTx/>
+                        <a:buNone/>
+                        <a:tabLst/>
+                        <a:defRPr/>
+                      </a:pPr>
+                      <a:r>
+                        <a:rPr lang="en-US" dirty="0"/>
+                        <a:t>Previous stage passed.</a:t>
+                      </a:r>
+                    </a:p>
+                  </a:txBody>
+                  <a:tcPr/>
+                </a:tc>
+                <a:tc>
+                  <a:txBody>
+                    <a:bodyPr/>
+                    <a:lstStyle/>
+                    <a:p>
+                      <a:endParaRPr lang="en-US" dirty="0"/>
+                    </a:p>
+                  </a:txBody>
+                  <a:tcPr/>
+                </a:tc>
+                <a:tc>
+                  <a:txBody>
+                    <a:bodyPr/>
+                    <a:lstStyle/>
+                    <a:p>
+                      <a:endParaRPr lang="en-US" dirty="0"/>
+                    </a:p>
+                  </a:txBody>
+                  <a:tcPr/>
+                </a:tc>
+                <a:extLst>
+                  <a:ext uri="{0D108BD9-81ED-4DB2-BD59-A6C34878D82A}">
+                    <a16:rowId xmlns:a16="http://schemas.microsoft.com/office/drawing/2014/main" val="1231025186"/>
+                  </a:ext>
+                </a:extLst>
+              </a:tr>
+              <a:tr h="370840">
+                <a:tc>
+                  <a:txBody>
+                    <a:bodyPr/>
+                    <a:lstStyle/>
+                    <a:p>
+                      <a:pPr algn="ctr"/>
+                      <a:r>
+                        <a:rPr lang="en-US" dirty="0"/>
+                        <a:t>3</a:t>
+                      </a:r>
+                    </a:p>
+                  </a:txBody>
+                  <a:tcPr/>
+                </a:tc>
+                <a:tc>
+                  <a:txBody>
+                    <a:bodyPr/>
+                    <a:lstStyle/>
+                    <a:p>
+                      <a:r>
+                        <a:rPr lang="en-US" dirty="0"/>
+                        <a:t>Detailed Design</a:t>
+                      </a:r>
+                    </a:p>
+                  </a:txBody>
+                  <a:tcPr/>
+                </a:tc>
+                <a:tc>
+                  <a:txBody>
+                    <a:bodyPr/>
+                    <a:lstStyle/>
+                    <a:p>
+                      <a:pPr marL="0" marR="0" lvl="0" indent="0" algn="l" defTabSz="914400" rtl="0" eaLnBrk="1" fontAlgn="auto" latinLnBrk="0" hangingPunct="1">
+                        <a:lnSpc>
+                          <a:spcPct val="100000"/>
+                        </a:lnSpc>
+                        <a:spcBef>
+                          <a:spcPts val="0"/>
+                        </a:spcBef>
+                        <a:spcAft>
+                          <a:spcPts val="0"/>
+                        </a:spcAft>
+                        <a:buClrTx/>
+                        <a:buSzTx/>
+                        <a:buFontTx/>
+                        <a:buNone/>
+                        <a:tabLst/>
+                        <a:defRPr/>
+                      </a:pPr>
+                      <a:r>
+                        <a:rPr lang="en-US" dirty="0"/>
+                        <a:t>Previous stage passed.</a:t>
+                      </a:r>
+                    </a:p>
+                  </a:txBody>
+                  <a:tcPr/>
+                </a:tc>
+                <a:tc>
+                  <a:txBody>
+                    <a:bodyPr/>
+                    <a:lstStyle/>
+                    <a:p>
+                      <a:endParaRPr lang="en-US" dirty="0"/>
+                    </a:p>
+                  </a:txBody>
+                  <a:tcPr/>
+                </a:tc>
+                <a:tc>
+                  <a:txBody>
+                    <a:bodyPr/>
+                    <a:lstStyle/>
+                    <a:p>
+                      <a:endParaRPr lang="en-US" dirty="0"/>
+                    </a:p>
+                  </a:txBody>
+                  <a:tcPr/>
+                </a:tc>
+                <a:extLst>
+                  <a:ext uri="{0D108BD9-81ED-4DB2-BD59-A6C34878D82A}">
+                    <a16:rowId xmlns:a16="http://schemas.microsoft.com/office/drawing/2014/main" val="1184394165"/>
+                  </a:ext>
+                </a:extLst>
+              </a:tr>
+              <a:tr h="370840">
+                <a:tc>
+                  <a:txBody>
+                    <a:bodyPr/>
+                    <a:lstStyle/>
+                    <a:p>
+                      <a:pPr algn="ctr"/>
+                      <a:r>
+                        <a:rPr lang="en-US" dirty="0"/>
+                        <a:t>4</a:t>
+                      </a:r>
+                    </a:p>
+                  </a:txBody>
+                  <a:tcPr/>
+                </a:tc>
+                <a:tc>
+                  <a:txBody>
+                    <a:bodyPr/>
+                    <a:lstStyle/>
+                    <a:p>
+                      <a:r>
+                        <a:rPr lang="en-US" dirty="0"/>
+                        <a:t>Execution</a:t>
+                      </a:r>
+                    </a:p>
+                  </a:txBody>
+                  <a:tcPr/>
+                </a:tc>
+                <a:tc>
+                  <a:txBody>
+                    <a:bodyPr/>
+                    <a:lstStyle/>
+                    <a:p>
+                      <a:pPr marL="0" marR="0" lvl="0" indent="0" algn="l" defTabSz="914400" rtl="0" eaLnBrk="1" fontAlgn="auto" latinLnBrk="0" hangingPunct="1">
+                        <a:lnSpc>
+                          <a:spcPct val="100000"/>
+                        </a:lnSpc>
+                        <a:spcBef>
+                          <a:spcPts val="0"/>
+                        </a:spcBef>
+                        <a:spcAft>
+                          <a:spcPts val="0"/>
+                        </a:spcAft>
+                        <a:buClrTx/>
+                        <a:buSzTx/>
+                        <a:buFontTx/>
+                        <a:buNone/>
+                        <a:tabLst/>
+                        <a:defRPr/>
+                      </a:pPr>
+                      <a:r>
+                        <a:rPr lang="en-US" dirty="0"/>
+                        <a:t>Previous stage passed.</a:t>
+                      </a:r>
+                    </a:p>
+                  </a:txBody>
+                  <a:tcPr/>
+                </a:tc>
+                <a:tc>
+                  <a:txBody>
+                    <a:bodyPr/>
+                    <a:lstStyle/>
+                    <a:p>
+                      <a:endParaRPr lang="en-US" dirty="0"/>
+                    </a:p>
+                  </a:txBody>
+                  <a:tcPr/>
+                </a:tc>
+                <a:tc>
+                  <a:txBody>
+                    <a:bodyPr/>
+                    <a:lstStyle/>
+                    <a:p>
+                      <a:endParaRPr lang="en-US" dirty="0"/>
+                    </a:p>
+                  </a:txBody>
+                  <a:tcPr/>
+                </a:tc>
+                <a:extLst>
+                  <a:ext uri="{0D108BD9-81ED-4DB2-BD59-A6C34878D82A}">
+                    <a16:rowId xmlns:a16="http://schemas.microsoft.com/office/drawing/2014/main" val="836048738"/>
+                  </a:ext>
+                </a:extLst>
+              </a:tr>
+              <a:tr h="370840">
+                <a:tc>
+                  <a:txBody>
+                    <a:bodyPr/>
+                    <a:lstStyle/>
+                    <a:p>
+                      <a:pPr algn="ctr"/>
+                      <a:r>
+                        <a:rPr lang="en-US" dirty="0"/>
+                        <a:t>5</a:t>
+                      </a:r>
+                    </a:p>
+                  </a:txBody>
+                  <a:tcPr/>
+                </a:tc>
+                <a:tc>
+                  <a:txBody>
+                    <a:bodyPr/>
+                    <a:lstStyle/>
+                    <a:p>
+                      <a:r>
+                        <a:rPr lang="en-US" dirty="0"/>
+                        <a:t>Commissioning</a:t>
+                      </a:r>
+                    </a:p>
+                  </a:txBody>
+                  <a:tcPr/>
+                </a:tc>
+                <a:tc>
+                  <a:txBody>
+                    <a:bodyPr/>
+                    <a:lstStyle/>
+                    <a:p>
+                      <a:pPr marL="0" marR="0" lvl="0" indent="0" algn="l" defTabSz="914400" rtl="0" eaLnBrk="1" fontAlgn="auto" latinLnBrk="0" hangingPunct="1">
+                        <a:lnSpc>
+                          <a:spcPct val="100000"/>
+                        </a:lnSpc>
+                        <a:spcBef>
+                          <a:spcPts val="0"/>
+                        </a:spcBef>
+                        <a:spcAft>
+                          <a:spcPts val="0"/>
+                        </a:spcAft>
+                        <a:buClrTx/>
+                        <a:buSzTx/>
+                        <a:buFontTx/>
+                        <a:buNone/>
+                        <a:tabLst/>
+                        <a:defRPr/>
+                      </a:pPr>
+                      <a:r>
+                        <a:rPr lang="en-US" dirty="0"/>
+                        <a:t>Previous stage passed.</a:t>
+                      </a:r>
+                    </a:p>
+                  </a:txBody>
+                  <a:tcPr/>
+                </a:tc>
+                <a:tc>
+                  <a:txBody>
+                    <a:bodyPr/>
+                    <a:lstStyle/>
+                    <a:p>
+                      <a:endParaRPr lang="en-US" dirty="0"/>
+                    </a:p>
+                  </a:txBody>
+                  <a:tcPr/>
+                </a:tc>
+                <a:tc>
+                  <a:txBody>
+                    <a:bodyPr/>
+                    <a:lstStyle/>
+                    <a:p>
+                      <a:endParaRPr lang="en-US" dirty="0"/>
+                    </a:p>
+                  </a:txBody>
+                  <a:tcPr/>
+                </a:tc>
+                <a:extLst>
+                  <a:ext uri="{0D108BD9-81ED-4DB2-BD59-A6C34878D82A}">
+                    <a16:rowId xmlns:a16="http://schemas.microsoft.com/office/drawing/2014/main" val="4283437293"/>
+                  </a:ext>
+                </a:extLst>
+              </a:tr>
+              <a:tr h="370840">
+                <a:tc>
+                  <a:txBody>
+                    <a:bodyPr/>
+                    <a:lstStyle/>
+                    <a:p>
+                      <a:pPr algn="ctr"/>
+                      <a:r>
+                        <a:rPr lang="en-US" dirty="0"/>
+                        <a:t>6</a:t>
+                      </a:r>
+                    </a:p>
+                  </a:txBody>
+                  <a:tcPr/>
+                </a:tc>
+                <a:tc>
+                  <a:txBody>
+                    <a:bodyPr/>
+                    <a:lstStyle/>
+                    <a:p>
+                      <a:r>
+                        <a:rPr lang="en-US" dirty="0"/>
+                        <a:t>Closeout</a:t>
+                      </a:r>
+                    </a:p>
+                  </a:txBody>
+                  <a:tcPr/>
+                </a:tc>
+                <a:tc>
+                  <a:txBody>
+                    <a:bodyPr/>
+                    <a:lstStyle/>
+                    <a:p>
+                      <a:pPr marL="0" marR="0" lvl="0" indent="0" algn="l" defTabSz="914400" rtl="0" eaLnBrk="1" fontAlgn="auto" latinLnBrk="0" hangingPunct="1">
+                        <a:lnSpc>
+                          <a:spcPct val="100000"/>
+                        </a:lnSpc>
+                        <a:spcBef>
+                          <a:spcPts val="0"/>
+                        </a:spcBef>
+                        <a:spcAft>
+                          <a:spcPts val="0"/>
+                        </a:spcAft>
+                        <a:buClrTx/>
+                        <a:buSzTx/>
+                        <a:buFontTx/>
+                        <a:buNone/>
+                        <a:tabLst/>
+                        <a:defRPr/>
+                      </a:pPr>
+                      <a:r>
+                        <a:rPr lang="en-US" dirty="0"/>
+                        <a:t>Considered ‘done’ and ready for use.</a:t>
+                      </a:r>
+                    </a:p>
+                  </a:txBody>
+                  <a:tcPr/>
+                </a:tc>
+                <a:tc>
+                  <a:txBody>
+                    <a:bodyPr/>
+                    <a:lstStyle/>
+                    <a:p>
+                      <a:endParaRPr lang="en-US" dirty="0"/>
+                    </a:p>
+                  </a:txBody>
+                  <a:tcPr/>
+                </a:tc>
+                <a:tc>
+                  <a:txBody>
+                    <a:bodyPr/>
+                    <a:lstStyle/>
+                    <a:p>
+                      <a:endParaRPr lang="en-US" dirty="0"/>
+                    </a:p>
+                  </a:txBody>
+                  <a:tcPr/>
+                </a:tc>
+                <a:extLst>
+                  <a:ext uri="{0D108BD9-81ED-4DB2-BD59-A6C34878D82A}">
+                    <a16:rowId xmlns:a16="http://schemas.microsoft.com/office/drawing/2014/main" val="2176051796"/>
+                  </a:ext>
+                </a:extLst>
+              </a:tr>
+            </a:tbl>
+          </a:graphicData>
+        </a:graphic>
+      </p:graphicFrame>
       <p:sp>
         <p:nvSpPr>
-          <p:cNvPr id="9" name="TextBox 8">
+          <p:cNvPr id="4" name="TextBox 3">
             <a:extLst>
               <a:ext uri="{FF2B5EF4-FFF2-40B4-BE49-F238E27FC236}">
-                <a16:creationId xmlns:a16="http://schemas.microsoft.com/office/drawing/2014/main" id="{475CF317-0BD7-4A39-A278-3EF77E1FFAB9}"/>
+                <a16:creationId xmlns:a16="http://schemas.microsoft.com/office/drawing/2014/main" id="{3A679939-F7FB-4DAE-AD3C-6F85F7B51F2E}"/>
               </a:ext>
             </a:extLst>
           </p:cNvPr>
@@ -15343,8 +16325,8 @@
         </p:nvSpPr>
         <p:spPr>
           <a:xfrm>
-            <a:off x="324287" y="3993052"/>
-            <a:ext cx="6102990" cy="369332"/>
+            <a:off x="1213607" y="4932727"/>
+            <a:ext cx="9764786" cy="923330"/>
           </a:xfrm>
           <a:prstGeom prst="rect">
             <a:avLst/>
@@ -15352,69 +16334,1183 @@
           <a:noFill/>
         </p:spPr>
         <p:txBody>
-          <a:bodyPr wrap="square">
+          <a:bodyPr wrap="square" rtlCol="0">
             <a:spAutoFit/>
           </a:bodyPr>
           <a:lstStyle/>
           <a:p>
             <a:r>
               <a:rPr lang="en-US" dirty="0"/>
-              <a:t>http://trainelectronics.com/DCC_Arduino/index.htm</a:t>
+              <a:t>Implied is that in all cases a phase can only happen if someone is willing to work that phase (Obviously some resources/effort will be needed).  As MERG is a volunteer organization this could be an individual or a ‘working group’.</a:t>
             </a:r>
           </a:p>
         </p:txBody>
       </p:sp>
-      <p:pic>
-        <p:nvPicPr>
-          <p:cNvPr id="1026" name="Picture 2">
+    </p:spTree>
+    <p:extLst>
+      <p:ext uri="{BB962C8B-B14F-4D97-AF65-F5344CB8AC3E}">
+        <p14:creationId xmlns:p14="http://schemas.microsoft.com/office/powerpoint/2010/main" val="1479574736"/>
+      </p:ext>
+    </p:extLst>
+  </p:cSld>
+  <p:clrMapOvr>
+    <a:masterClrMapping/>
+  </p:clrMapOvr>
+</p:sld>
+</file>
+
+<file path=ppt/slides/slide9.xml><?xml version="1.0" encoding="utf-8"?>
+<p:sld xmlns:a="http://schemas.openxmlformats.org/drawingml/2006/main" xmlns:r="http://schemas.openxmlformats.org/officeDocument/2006/relationships" xmlns:p="http://schemas.openxmlformats.org/presentationml/2006/main">
+  <p:cSld>
+    <p:spTree>
+      <p:nvGrpSpPr>
+        <p:cNvPr id="1" name=""/>
+        <p:cNvGrpSpPr/>
+        <p:nvPr/>
+      </p:nvGrpSpPr>
+      <p:grpSpPr>
+        <a:xfrm>
+          <a:off x="0" y="0"/>
+          <a:ext cx="0" cy="0"/>
+          <a:chOff x="0" y="0"/>
+          <a:chExt cx="0" cy="0"/>
+        </a:xfrm>
+      </p:grpSpPr>
+      <p:sp>
+        <p:nvSpPr>
+          <p:cNvPr id="2" name="Title 1">
             <a:extLst>
               <a:ext uri="{FF2B5EF4-FFF2-40B4-BE49-F238E27FC236}">
-                <a16:creationId xmlns:a16="http://schemas.microsoft.com/office/drawing/2014/main" id="{AA7CB4F8-2EB6-43EC-9D99-BA507B9E00AF}"/>
+                <a16:creationId xmlns:a16="http://schemas.microsoft.com/office/drawing/2014/main" id="{68C3ECC6-4864-4365-A835-A7F076D4DB5C}"/>
               </a:ext>
             </a:extLst>
           </p:cNvPr>
-          <p:cNvPicPr>
-            <a:picLocks noChangeAspect="1" noChangeArrowheads="1"/>
-          </p:cNvPicPr>
-          <p:nvPr/>
-        </p:nvPicPr>
-        <p:blipFill>
-          <a:blip r:embed="rId3">
+          <p:cNvSpPr>
+            <a:spLocks noGrp="1"/>
+          </p:cNvSpPr>
+          <p:nvPr>
+            <p:ph type="title"/>
+          </p:nvPr>
+        </p:nvSpPr>
+        <p:spPr>
+          <a:xfrm>
+            <a:off x="1143001" y="159944"/>
+            <a:ext cx="9905998" cy="757276"/>
+          </a:xfrm>
+        </p:spPr>
+        <p:txBody>
+          <a:bodyPr/>
+          <a:lstStyle/>
+          <a:p>
+            <a:r>
+              <a:rPr lang="en-US" dirty="0">
+                <a:solidFill>
+                  <a:srgbClr val="00B050"/>
+                </a:solidFill>
+                <a:latin typeface="Checkbook" panose="020B0000000000000000" pitchFamily="34" charset="0"/>
+              </a:rPr>
+              <a:t>MERGduino: </a:t>
+            </a:r>
+            <a:r>
+              <a:rPr lang="en-US" dirty="0">
+                <a:solidFill>
+                  <a:srgbClr val="FF0000"/>
+                </a:solidFill>
+                <a:latin typeface="Checkbook" panose="020B0000000000000000" pitchFamily="34" charset="0"/>
+              </a:rPr>
+              <a:t>issues and outcomes</a:t>
+            </a:r>
+            <a:endParaRPr lang="en-US" dirty="0">
+              <a:solidFill>
+                <a:srgbClr val="FF0000"/>
+              </a:solidFill>
+            </a:endParaRPr>
+          </a:p>
+        </p:txBody>
+      </p:sp>
+      <p:graphicFrame>
+        <p:nvGraphicFramePr>
+          <p:cNvPr id="3" name="Table 3">
             <a:extLst>
-              <a:ext uri="{28A0092B-C50C-407E-A947-70E740481C1C}">
-                <a14:useLocalDpi xmlns:a14="http://schemas.microsoft.com/office/drawing/2010/main" val="0"/>
+              <a:ext uri="{FF2B5EF4-FFF2-40B4-BE49-F238E27FC236}">
+                <a16:creationId xmlns:a16="http://schemas.microsoft.com/office/drawing/2014/main" id="{A0507852-E66F-4053-BA5E-0427BC62CC37}"/>
               </a:ext>
             </a:extLst>
-          </a:blip>
-          <a:srcRect/>
-          <a:stretch>
-            <a:fillRect/>
-          </a:stretch>
-        </p:blipFill>
-        <p:spPr bwMode="auto">
-          <a:xfrm>
-            <a:off x="5343787" y="2527871"/>
-            <a:ext cx="5832632" cy="4074265"/>
-          </a:xfrm>
-          <a:prstGeom prst="rect">
-            <a:avLst/>
-          </a:prstGeom>
-          <a:noFill/>
-          <a:extLst>
-            <a:ext uri="{909E8E84-426E-40DD-AFC4-6F175D3DCCD1}">
-              <a14:hiddenFill xmlns:a14="http://schemas.microsoft.com/office/drawing/2010/main">
-                <a:solidFill>
-                  <a:srgbClr val="FFFFFF"/>
-                </a:solidFill>
-              </a14:hiddenFill>
-            </a:ext>
-          </a:extLst>
-        </p:spPr>
-      </p:pic>
+          </p:cNvPr>
+          <p:cNvGraphicFramePr>
+            <a:graphicFrameLocks noGrp="1"/>
+          </p:cNvGraphicFramePr>
+          <p:nvPr>
+            <p:extLst>
+              <p:ext uri="{D42A27DB-BD31-4B8C-83A1-F6EECF244321}">
+                <p14:modId xmlns:p14="http://schemas.microsoft.com/office/powerpoint/2010/main" val="1957285131"/>
+              </p:ext>
+            </p:extLst>
+          </p:nvPr>
+        </p:nvGraphicFramePr>
+        <p:xfrm>
+          <a:off x="844492" y="917220"/>
+          <a:ext cx="10503016" cy="5684520"/>
+        </p:xfrm>
+        <a:graphic>
+          <a:graphicData uri="http://schemas.openxmlformats.org/drawingml/2006/table">
+            <a:tbl>
+              <a:tblPr firstRow="1" bandRow="1">
+                <a:tableStyleId>{5C22544A-7EE6-4342-B048-85BDC9FD1C3A}</a:tableStyleId>
+              </a:tblPr>
+              <a:tblGrid>
+                <a:gridCol w="757805">
+                  <a:extLst>
+                    <a:ext uri="{9D8B030D-6E8A-4147-A177-3AD203B41FA5}">
+                      <a16:colId xmlns:a16="http://schemas.microsoft.com/office/drawing/2014/main" val="2598000485"/>
+                    </a:ext>
+                  </a:extLst>
+                </a:gridCol>
+                <a:gridCol w="1577131">
+                  <a:extLst>
+                    <a:ext uri="{9D8B030D-6E8A-4147-A177-3AD203B41FA5}">
+                      <a16:colId xmlns:a16="http://schemas.microsoft.com/office/drawing/2014/main" val="3863070693"/>
+                    </a:ext>
+                  </a:extLst>
+                </a:gridCol>
+                <a:gridCol w="3003258">
+                  <a:extLst>
+                    <a:ext uri="{9D8B030D-6E8A-4147-A177-3AD203B41FA5}">
+                      <a16:colId xmlns:a16="http://schemas.microsoft.com/office/drawing/2014/main" val="429033357"/>
+                    </a:ext>
+                  </a:extLst>
+                </a:gridCol>
+                <a:gridCol w="3045204">
+                  <a:extLst>
+                    <a:ext uri="{9D8B030D-6E8A-4147-A177-3AD203B41FA5}">
+                      <a16:colId xmlns:a16="http://schemas.microsoft.com/office/drawing/2014/main" val="3085965303"/>
+                    </a:ext>
+                  </a:extLst>
+                </a:gridCol>
+                <a:gridCol w="1207280">
+                  <a:extLst>
+                    <a:ext uri="{9D8B030D-6E8A-4147-A177-3AD203B41FA5}">
+                      <a16:colId xmlns:a16="http://schemas.microsoft.com/office/drawing/2014/main" val="3983995983"/>
+                    </a:ext>
+                  </a:extLst>
+                </a:gridCol>
+                <a:gridCol w="912338">
+                  <a:extLst>
+                    <a:ext uri="{9D8B030D-6E8A-4147-A177-3AD203B41FA5}">
+                      <a16:colId xmlns:a16="http://schemas.microsoft.com/office/drawing/2014/main" val="156959021"/>
+                    </a:ext>
+                  </a:extLst>
+                </a:gridCol>
+              </a:tblGrid>
+              <a:tr h="370840">
+                <a:tc>
+                  <a:txBody>
+                    <a:bodyPr/>
+                    <a:lstStyle/>
+                    <a:p>
+                      <a:pPr algn="ctr"/>
+                      <a:r>
+                        <a:rPr lang="en-US" dirty="0"/>
+                        <a:t>Item</a:t>
+                      </a:r>
+                    </a:p>
+                  </a:txBody>
+                  <a:tcPr/>
+                </a:tc>
+                <a:tc>
+                  <a:txBody>
+                    <a:bodyPr/>
+                    <a:lstStyle/>
+                    <a:p>
+                      <a:r>
+                        <a:rPr lang="en-US" dirty="0"/>
+                        <a:t>Description</a:t>
+                      </a:r>
+                    </a:p>
+                  </a:txBody>
+                  <a:tcPr/>
+                </a:tc>
+                <a:tc>
+                  <a:txBody>
+                    <a:bodyPr/>
+                    <a:lstStyle/>
+                    <a:p>
+                      <a:r>
+                        <a:rPr lang="en-US" dirty="0"/>
+                        <a:t>Reasons Why</a:t>
+                      </a:r>
+                    </a:p>
+                  </a:txBody>
+                  <a:tcPr/>
+                </a:tc>
+                <a:tc>
+                  <a:txBody>
+                    <a:bodyPr/>
+                    <a:lstStyle/>
+                    <a:p>
+                      <a:pPr marL="0" marR="0" lvl="0" indent="0" algn="l" defTabSz="914400" rtl="0" eaLnBrk="1" fontAlgn="auto" latinLnBrk="0" hangingPunct="1">
+                        <a:lnSpc>
+                          <a:spcPct val="100000"/>
+                        </a:lnSpc>
+                        <a:spcBef>
+                          <a:spcPts val="0"/>
+                        </a:spcBef>
+                        <a:spcAft>
+                          <a:spcPts val="0"/>
+                        </a:spcAft>
+                        <a:buClrTx/>
+                        <a:buSzTx/>
+                        <a:buFontTx/>
+                        <a:buNone/>
+                        <a:tabLst/>
+                        <a:defRPr/>
+                      </a:pPr>
+                      <a:r>
+                        <a:rPr lang="en-US" dirty="0"/>
+                        <a:t>Reasons Why NOT</a:t>
+                      </a:r>
+                    </a:p>
+                  </a:txBody>
+                  <a:tcPr/>
+                </a:tc>
+                <a:tc>
+                  <a:txBody>
+                    <a:bodyPr/>
+                    <a:lstStyle/>
+                    <a:p>
+                      <a:r>
+                        <a:rPr lang="en-US" dirty="0"/>
+                        <a:t>Decision</a:t>
+                      </a:r>
+                    </a:p>
+                  </a:txBody>
+                  <a:tcPr/>
+                </a:tc>
+                <a:tc>
+                  <a:txBody>
+                    <a:bodyPr/>
+                    <a:lstStyle/>
+                    <a:p>
+                      <a:r>
+                        <a:rPr lang="en-US" dirty="0"/>
+                        <a:t>When</a:t>
+                      </a:r>
+                    </a:p>
+                  </a:txBody>
+                  <a:tcPr/>
+                </a:tc>
+                <a:extLst>
+                  <a:ext uri="{0D108BD9-81ED-4DB2-BD59-A6C34878D82A}">
+                    <a16:rowId xmlns:a16="http://schemas.microsoft.com/office/drawing/2014/main" val="2495785719"/>
+                  </a:ext>
+                </a:extLst>
+              </a:tr>
+              <a:tr h="370840">
+                <a:tc>
+                  <a:txBody>
+                    <a:bodyPr/>
+                    <a:lstStyle/>
+                    <a:p>
+                      <a:pPr algn="ctr"/>
+                      <a:r>
+                        <a:rPr lang="en-US" dirty="0"/>
+                        <a:t>0</a:t>
+                      </a:r>
+                    </a:p>
+                  </a:txBody>
+                  <a:tcPr/>
+                </a:tc>
+                <a:tc>
+                  <a:txBody>
+                    <a:bodyPr/>
+                    <a:lstStyle/>
+                    <a:p>
+                      <a:r>
+                        <a:rPr lang="en-US" dirty="0"/>
+                        <a:t>Use 5 VDC Power to Arduino </a:t>
+                      </a:r>
+                    </a:p>
+                  </a:txBody>
+                  <a:tcPr/>
+                </a:tc>
+                <a:tc>
+                  <a:txBody>
+                    <a:bodyPr/>
+                    <a:lstStyle/>
+                    <a:p>
+                      <a:pPr marL="0" marR="0" lvl="0" indent="0" algn="l" defTabSz="914400" rtl="0" eaLnBrk="1" fontAlgn="auto" latinLnBrk="0" hangingPunct="1">
+                        <a:lnSpc>
+                          <a:spcPct val="100000"/>
+                        </a:lnSpc>
+                        <a:spcBef>
+                          <a:spcPts val="0"/>
+                        </a:spcBef>
+                        <a:spcAft>
+                          <a:spcPts val="0"/>
+                        </a:spcAft>
+                        <a:buClrTx/>
+                        <a:buSzTx/>
+                        <a:buFontTx/>
+                        <a:buNone/>
+                        <a:tabLst/>
+                        <a:defRPr/>
+                      </a:pPr>
+                      <a:r>
+                        <a:rPr lang="en-US" dirty="0"/>
+                        <a:t>Using 7805 gives more flexible input power options including standard 9 volt battery and 12 VDC. Offloads NANO regulator</a:t>
+                      </a:r>
+                    </a:p>
+                  </a:txBody>
+                  <a:tcPr/>
+                </a:tc>
+                <a:tc>
+                  <a:txBody>
+                    <a:bodyPr/>
+                    <a:lstStyle/>
+                    <a:p>
+                      <a:pPr marL="0" marR="0" lvl="0" indent="0" algn="l" defTabSz="914400" rtl="0" eaLnBrk="1" fontAlgn="auto" latinLnBrk="0" hangingPunct="1">
+                        <a:lnSpc>
+                          <a:spcPct val="100000"/>
+                        </a:lnSpc>
+                        <a:spcBef>
+                          <a:spcPts val="0"/>
+                        </a:spcBef>
+                        <a:spcAft>
+                          <a:spcPts val="0"/>
+                        </a:spcAft>
+                        <a:buClrTx/>
+                        <a:buSzTx/>
+                        <a:buFontTx/>
+                        <a:buNone/>
+                        <a:tabLst/>
+                        <a:defRPr/>
+                      </a:pPr>
+                      <a:r>
+                        <a:rPr lang="en-US" dirty="0"/>
+                        <a:t>Reference design used a 7812</a:t>
+                      </a:r>
+                    </a:p>
+                  </a:txBody>
+                  <a:tcPr/>
+                </a:tc>
+                <a:tc>
+                  <a:txBody>
+                    <a:bodyPr/>
+                    <a:lstStyle/>
+                    <a:p>
+                      <a:endParaRPr lang="en-US" dirty="0"/>
+                    </a:p>
+                  </a:txBody>
+                  <a:tcPr/>
+                </a:tc>
+                <a:tc>
+                  <a:txBody>
+                    <a:bodyPr/>
+                    <a:lstStyle/>
+                    <a:p>
+                      <a:endParaRPr lang="en-US" dirty="0"/>
+                    </a:p>
+                  </a:txBody>
+                  <a:tcPr/>
+                </a:tc>
+                <a:extLst>
+                  <a:ext uri="{0D108BD9-81ED-4DB2-BD59-A6C34878D82A}">
+                    <a16:rowId xmlns:a16="http://schemas.microsoft.com/office/drawing/2014/main" val="3523431365"/>
+                  </a:ext>
+                </a:extLst>
+              </a:tr>
+              <a:tr h="370840">
+                <a:tc>
+                  <a:txBody>
+                    <a:bodyPr/>
+                    <a:lstStyle/>
+                    <a:p>
+                      <a:pPr algn="ctr"/>
+                      <a:r>
+                        <a:rPr lang="en-US" dirty="0"/>
+                        <a:t>1</a:t>
+                      </a:r>
+                    </a:p>
+                  </a:txBody>
+                  <a:tcPr/>
+                </a:tc>
+                <a:tc>
+                  <a:txBody>
+                    <a:bodyPr/>
+                    <a:lstStyle/>
+                    <a:p>
+                      <a:r>
+                        <a:rPr lang="en-US" dirty="0"/>
+                        <a:t>Keep Line Driver IC</a:t>
+                      </a:r>
+                    </a:p>
+                  </a:txBody>
+                  <a:tcPr/>
+                </a:tc>
+                <a:tc>
+                  <a:txBody>
+                    <a:bodyPr/>
+                    <a:lstStyle/>
+                    <a:p>
+                      <a:pPr marL="0" marR="0" lvl="0" indent="0" algn="l" defTabSz="914400" rtl="0" eaLnBrk="1" fontAlgn="auto" latinLnBrk="0" hangingPunct="1">
+                        <a:lnSpc>
+                          <a:spcPct val="100000"/>
+                        </a:lnSpc>
+                        <a:spcBef>
+                          <a:spcPts val="0"/>
+                        </a:spcBef>
+                        <a:spcAft>
+                          <a:spcPts val="0"/>
+                        </a:spcAft>
+                        <a:buClrTx/>
+                        <a:buSzTx/>
+                        <a:buFontTx/>
+                        <a:buNone/>
+                        <a:tabLst/>
+                        <a:defRPr/>
+                      </a:pPr>
+                      <a:r>
+                        <a:rPr lang="en-US" dirty="0"/>
+                        <a:t>Allows higher current loads of independent voltages. Protects NANO</a:t>
+                      </a:r>
+                    </a:p>
+                  </a:txBody>
+                  <a:tcPr/>
+                </a:tc>
+                <a:tc>
+                  <a:txBody>
+                    <a:bodyPr/>
+                    <a:lstStyle/>
+                    <a:p>
+                      <a:pPr marL="0" marR="0" lvl="0" indent="0" algn="l" defTabSz="914400" rtl="0" eaLnBrk="1" fontAlgn="auto" latinLnBrk="0" hangingPunct="1">
+                        <a:lnSpc>
+                          <a:spcPct val="100000"/>
+                        </a:lnSpc>
+                        <a:spcBef>
+                          <a:spcPts val="0"/>
+                        </a:spcBef>
+                        <a:spcAft>
+                          <a:spcPts val="0"/>
+                        </a:spcAft>
+                        <a:buClrTx/>
+                        <a:buSzTx/>
+                        <a:buFontTx/>
+                        <a:buNone/>
+                        <a:tabLst/>
+                        <a:defRPr/>
+                      </a:pPr>
+                      <a:r>
+                        <a:rPr lang="en-US" dirty="0"/>
+                        <a:t>Cost in terms of PCB space</a:t>
+                      </a:r>
+                    </a:p>
+                    <a:p>
+                      <a:pPr marL="0" marR="0" lvl="0" indent="0" algn="l" defTabSz="914400" rtl="0" eaLnBrk="1" fontAlgn="auto" latinLnBrk="0" hangingPunct="1">
+                        <a:lnSpc>
+                          <a:spcPct val="100000"/>
+                        </a:lnSpc>
+                        <a:spcBef>
+                          <a:spcPts val="0"/>
+                        </a:spcBef>
+                        <a:spcAft>
+                          <a:spcPts val="0"/>
+                        </a:spcAft>
+                        <a:buClrTx/>
+                        <a:buSzTx/>
+                        <a:buFontTx/>
+                        <a:buNone/>
+                        <a:tabLst/>
+                        <a:defRPr/>
+                      </a:pPr>
+                      <a:r>
+                        <a:rPr lang="en-US" dirty="0"/>
+                        <a:t>Part cost (pennies) </a:t>
+                      </a:r>
+                    </a:p>
+                  </a:txBody>
+                  <a:tcPr/>
+                </a:tc>
+                <a:tc>
+                  <a:txBody>
+                    <a:bodyPr/>
+                    <a:lstStyle/>
+                    <a:p>
+                      <a:endParaRPr lang="en-US" dirty="0"/>
+                    </a:p>
+                  </a:txBody>
+                  <a:tcPr/>
+                </a:tc>
+                <a:tc>
+                  <a:txBody>
+                    <a:bodyPr/>
+                    <a:lstStyle/>
+                    <a:p>
+                      <a:endParaRPr lang="en-US" dirty="0"/>
+                    </a:p>
+                  </a:txBody>
+                  <a:tcPr/>
+                </a:tc>
+                <a:extLst>
+                  <a:ext uri="{0D108BD9-81ED-4DB2-BD59-A6C34878D82A}">
+                    <a16:rowId xmlns:a16="http://schemas.microsoft.com/office/drawing/2014/main" val="513001465"/>
+                  </a:ext>
+                </a:extLst>
+              </a:tr>
+              <a:tr h="370840">
+                <a:tc>
+                  <a:txBody>
+                    <a:bodyPr/>
+                    <a:lstStyle/>
+                    <a:p>
+                      <a:pPr algn="ctr"/>
+                      <a:r>
+                        <a:rPr lang="en-US" dirty="0"/>
+                        <a:t>2</a:t>
+                      </a:r>
+                    </a:p>
+                  </a:txBody>
+                  <a:tcPr/>
+                </a:tc>
+                <a:tc>
+                  <a:txBody>
+                    <a:bodyPr/>
+                    <a:lstStyle/>
+                    <a:p>
+                      <a:r>
+                        <a:rPr lang="en-US" sz="1400" dirty="0"/>
+                        <a:t>Choice of Current Limiting R value</a:t>
+                      </a:r>
+                    </a:p>
+                  </a:txBody>
+                  <a:tcPr/>
+                </a:tc>
+                <a:tc>
+                  <a:txBody>
+                    <a:bodyPr/>
+                    <a:lstStyle/>
+                    <a:p>
+                      <a:pPr marL="0" marR="0" lvl="0" indent="0" algn="l" defTabSz="914400" rtl="0" eaLnBrk="1" fontAlgn="auto" latinLnBrk="0" hangingPunct="1">
+                        <a:lnSpc>
+                          <a:spcPct val="100000"/>
+                        </a:lnSpc>
+                        <a:spcBef>
+                          <a:spcPts val="0"/>
+                        </a:spcBef>
+                        <a:spcAft>
+                          <a:spcPts val="0"/>
+                        </a:spcAft>
+                        <a:buClrTx/>
+                        <a:buSzTx/>
+                        <a:buFontTx/>
+                        <a:buNone/>
+                        <a:tabLst/>
+                        <a:defRPr/>
+                      </a:pPr>
+                      <a:r>
+                        <a:rPr lang="en-US" dirty="0"/>
+                        <a:t>R680 and R470 traditional</a:t>
+                      </a:r>
+                    </a:p>
+                  </a:txBody>
+                  <a:tcPr/>
+                </a:tc>
+                <a:tc>
+                  <a:txBody>
+                    <a:bodyPr/>
+                    <a:lstStyle/>
+                    <a:p>
+                      <a:pPr marL="0" marR="0" lvl="0" indent="0" algn="l" defTabSz="914400" rtl="0" eaLnBrk="1" fontAlgn="auto" latinLnBrk="0" hangingPunct="1">
+                        <a:lnSpc>
+                          <a:spcPct val="100000"/>
+                        </a:lnSpc>
+                        <a:spcBef>
+                          <a:spcPts val="0"/>
+                        </a:spcBef>
+                        <a:spcAft>
+                          <a:spcPts val="0"/>
+                        </a:spcAft>
+                        <a:buClrTx/>
+                        <a:buSzTx/>
+                        <a:buFontTx/>
+                        <a:buNone/>
+                        <a:tabLst/>
+                        <a:defRPr/>
+                      </a:pPr>
+                      <a:r>
+                        <a:rPr lang="en-US" dirty="0"/>
+                        <a:t>New LED’s more efficient – use R1K. </a:t>
+                      </a:r>
+                    </a:p>
+                  </a:txBody>
+                  <a:tcPr/>
+                </a:tc>
+                <a:tc>
+                  <a:txBody>
+                    <a:bodyPr/>
+                    <a:lstStyle/>
+                    <a:p>
+                      <a:r>
+                        <a:rPr lang="en-US" dirty="0"/>
+                        <a:t>Do some Testing</a:t>
+                      </a:r>
+                    </a:p>
+                  </a:txBody>
+                  <a:tcPr/>
+                </a:tc>
+                <a:tc>
+                  <a:txBody>
+                    <a:bodyPr/>
+                    <a:lstStyle/>
+                    <a:p>
+                      <a:endParaRPr lang="en-US" dirty="0"/>
+                    </a:p>
+                  </a:txBody>
+                  <a:tcPr/>
+                </a:tc>
+                <a:extLst>
+                  <a:ext uri="{0D108BD9-81ED-4DB2-BD59-A6C34878D82A}">
+                    <a16:rowId xmlns:a16="http://schemas.microsoft.com/office/drawing/2014/main" val="1231025186"/>
+                  </a:ext>
+                </a:extLst>
+              </a:tr>
+              <a:tr h="370840">
+                <a:tc>
+                  <a:txBody>
+                    <a:bodyPr/>
+                    <a:lstStyle/>
+                    <a:p>
+                      <a:pPr algn="ctr"/>
+                      <a:r>
+                        <a:rPr lang="en-US" dirty="0"/>
+                        <a:t>3</a:t>
+                      </a:r>
+                    </a:p>
+                  </a:txBody>
+                  <a:tcPr/>
+                </a:tc>
+                <a:tc>
+                  <a:txBody>
+                    <a:bodyPr/>
+                    <a:lstStyle/>
+                    <a:p>
+                      <a:r>
+                        <a:rPr lang="en-US" dirty="0"/>
+                        <a:t>External I2C pullup</a:t>
+                      </a:r>
+                    </a:p>
+                  </a:txBody>
+                  <a:tcPr/>
+                </a:tc>
+                <a:tc>
+                  <a:txBody>
+                    <a:bodyPr/>
+                    <a:lstStyle/>
+                    <a:p>
+                      <a:pPr marL="0" marR="0" lvl="0" indent="0" algn="l" defTabSz="914400" rtl="0" eaLnBrk="1" fontAlgn="auto" latinLnBrk="0" hangingPunct="1">
+                        <a:lnSpc>
+                          <a:spcPct val="100000"/>
+                        </a:lnSpc>
+                        <a:spcBef>
+                          <a:spcPts val="0"/>
+                        </a:spcBef>
+                        <a:spcAft>
+                          <a:spcPts val="0"/>
+                        </a:spcAft>
+                        <a:buClrTx/>
+                        <a:buSzTx/>
+                        <a:buFontTx/>
+                        <a:buNone/>
+                        <a:tabLst/>
+                        <a:defRPr/>
+                      </a:pPr>
+                      <a:r>
+                        <a:rPr lang="en-US" dirty="0"/>
+                        <a:t>Allows control over I2C value</a:t>
+                      </a:r>
+                    </a:p>
+                    <a:p>
+                      <a:pPr marL="0" marR="0" lvl="0" indent="0" algn="l" defTabSz="914400" rtl="0" eaLnBrk="1" fontAlgn="auto" latinLnBrk="0" hangingPunct="1">
+                        <a:lnSpc>
+                          <a:spcPct val="100000"/>
+                        </a:lnSpc>
+                        <a:spcBef>
+                          <a:spcPts val="0"/>
+                        </a:spcBef>
+                        <a:spcAft>
+                          <a:spcPts val="0"/>
+                        </a:spcAft>
+                        <a:buClrTx/>
+                        <a:buSzTx/>
+                        <a:buFontTx/>
+                        <a:buNone/>
+                        <a:tabLst/>
+                        <a:defRPr/>
+                      </a:pPr>
+                      <a:r>
+                        <a:rPr lang="en-US" dirty="0"/>
+                        <a:t>Simple soldering job and use of DMM lessons. Ohms Law.</a:t>
+                      </a:r>
+                    </a:p>
+                  </a:txBody>
+                  <a:tcPr/>
+                </a:tc>
+                <a:tc>
+                  <a:txBody>
+                    <a:bodyPr/>
+                    <a:lstStyle/>
+                    <a:p>
+                      <a:pPr marL="0" marR="0" lvl="0" indent="0" algn="l" defTabSz="914400" rtl="0" eaLnBrk="1" fontAlgn="auto" latinLnBrk="0" hangingPunct="1">
+                        <a:lnSpc>
+                          <a:spcPct val="100000"/>
+                        </a:lnSpc>
+                        <a:spcBef>
+                          <a:spcPts val="0"/>
+                        </a:spcBef>
+                        <a:spcAft>
+                          <a:spcPts val="0"/>
+                        </a:spcAft>
+                        <a:buClrTx/>
+                        <a:buSzTx/>
+                        <a:buFontTx/>
+                        <a:buNone/>
+                        <a:tabLst/>
+                        <a:defRPr/>
+                      </a:pPr>
+                      <a:r>
+                        <a:rPr lang="en-US" dirty="0"/>
+                        <a:t>Could use internal pullups</a:t>
+                      </a:r>
+                    </a:p>
+                    <a:p>
+                      <a:pPr marL="0" marR="0" lvl="0" indent="0" algn="l" defTabSz="914400" rtl="0" eaLnBrk="1" fontAlgn="auto" latinLnBrk="0" hangingPunct="1">
+                        <a:lnSpc>
+                          <a:spcPct val="100000"/>
+                        </a:lnSpc>
+                        <a:spcBef>
+                          <a:spcPts val="0"/>
+                        </a:spcBef>
+                        <a:spcAft>
+                          <a:spcPts val="0"/>
+                        </a:spcAft>
+                        <a:buClrTx/>
+                        <a:buSzTx/>
+                        <a:buFontTx/>
+                        <a:buNone/>
+                        <a:tabLst/>
+                        <a:defRPr/>
+                      </a:pPr>
+                      <a:r>
+                        <a:rPr lang="en-US" dirty="0"/>
+                        <a:t>Save real estate and cost (pennies) </a:t>
+                      </a:r>
+                    </a:p>
+                  </a:txBody>
+                  <a:tcPr/>
+                </a:tc>
+                <a:tc>
+                  <a:txBody>
+                    <a:bodyPr/>
+                    <a:lstStyle/>
+                    <a:p>
+                      <a:endParaRPr lang="en-US" dirty="0"/>
+                    </a:p>
+                  </a:txBody>
+                  <a:tcPr/>
+                </a:tc>
+                <a:tc>
+                  <a:txBody>
+                    <a:bodyPr/>
+                    <a:lstStyle/>
+                    <a:p>
+                      <a:endParaRPr lang="en-US" dirty="0"/>
+                    </a:p>
+                  </a:txBody>
+                  <a:tcPr/>
+                </a:tc>
+                <a:extLst>
+                  <a:ext uri="{0D108BD9-81ED-4DB2-BD59-A6C34878D82A}">
+                    <a16:rowId xmlns:a16="http://schemas.microsoft.com/office/drawing/2014/main" val="1184394165"/>
+                  </a:ext>
+                </a:extLst>
+              </a:tr>
+              <a:tr h="370840">
+                <a:tc>
+                  <a:txBody>
+                    <a:bodyPr/>
+                    <a:lstStyle/>
+                    <a:p>
+                      <a:pPr algn="ctr"/>
+                      <a:r>
+                        <a:rPr lang="en-US" dirty="0"/>
+                        <a:t>4</a:t>
+                      </a:r>
+                    </a:p>
+                  </a:txBody>
+                  <a:tcPr/>
+                </a:tc>
+                <a:tc>
+                  <a:txBody>
+                    <a:bodyPr/>
+                    <a:lstStyle/>
+                    <a:p>
+                      <a:r>
+                        <a:rPr lang="en-US" dirty="0"/>
+                        <a:t>Include MAX485</a:t>
+                      </a:r>
+                    </a:p>
+                  </a:txBody>
+                  <a:tcPr/>
+                </a:tc>
+                <a:tc>
+                  <a:txBody>
+                    <a:bodyPr/>
+                    <a:lstStyle/>
+                    <a:p>
+                      <a:pPr marL="0" marR="0" lvl="0" indent="0" algn="l" defTabSz="914400" rtl="0" eaLnBrk="1" fontAlgn="auto" latinLnBrk="0" hangingPunct="1">
+                        <a:lnSpc>
+                          <a:spcPct val="100000"/>
+                        </a:lnSpc>
+                        <a:spcBef>
+                          <a:spcPts val="0"/>
+                        </a:spcBef>
+                        <a:spcAft>
+                          <a:spcPts val="0"/>
+                        </a:spcAft>
+                        <a:buClrTx/>
+                        <a:buSzTx/>
+                        <a:buFontTx/>
+                        <a:buNone/>
+                        <a:tabLst/>
+                        <a:defRPr/>
+                      </a:pPr>
+                      <a:r>
+                        <a:rPr lang="en-US" dirty="0"/>
+                        <a:t>General RS485 comms</a:t>
+                      </a:r>
+                    </a:p>
+                    <a:p>
+                      <a:pPr marL="0" marR="0" lvl="0" indent="0" algn="l" defTabSz="914400" rtl="0" eaLnBrk="1" fontAlgn="auto" latinLnBrk="0" hangingPunct="1">
+                        <a:lnSpc>
+                          <a:spcPct val="100000"/>
+                        </a:lnSpc>
+                        <a:spcBef>
+                          <a:spcPts val="0"/>
+                        </a:spcBef>
+                        <a:spcAft>
+                          <a:spcPts val="0"/>
+                        </a:spcAft>
+                        <a:buClrTx/>
+                        <a:buSzTx/>
+                        <a:buFontTx/>
+                        <a:buNone/>
+                        <a:tabLst/>
+                        <a:defRPr/>
+                      </a:pPr>
+                      <a:r>
+                        <a:rPr lang="en-US" dirty="0"/>
+                        <a:t>CMRI connectivity</a:t>
+                      </a:r>
+                    </a:p>
+                  </a:txBody>
+                  <a:tcPr/>
+                </a:tc>
+                <a:tc>
+                  <a:txBody>
+                    <a:bodyPr/>
+                    <a:lstStyle/>
+                    <a:p>
+                      <a:pPr marL="0" marR="0" lvl="0" indent="0" algn="l" defTabSz="914400" rtl="0" eaLnBrk="1" fontAlgn="auto" latinLnBrk="0" hangingPunct="1">
+                        <a:lnSpc>
+                          <a:spcPct val="100000"/>
+                        </a:lnSpc>
+                        <a:spcBef>
+                          <a:spcPts val="0"/>
+                        </a:spcBef>
+                        <a:spcAft>
+                          <a:spcPts val="0"/>
+                        </a:spcAft>
+                        <a:buClrTx/>
+                        <a:buSzTx/>
+                        <a:buFontTx/>
+                        <a:buNone/>
+                        <a:tabLst/>
+                        <a:defRPr/>
+                      </a:pPr>
+                      <a:r>
+                        <a:rPr lang="en-US" dirty="0"/>
+                        <a:t>Cost in terms of PCB space</a:t>
+                      </a:r>
+                    </a:p>
+                    <a:p>
+                      <a:pPr marL="0" marR="0" lvl="0" indent="0" algn="l" defTabSz="914400" rtl="0" eaLnBrk="1" fontAlgn="auto" latinLnBrk="0" hangingPunct="1">
+                        <a:lnSpc>
+                          <a:spcPct val="100000"/>
+                        </a:lnSpc>
+                        <a:spcBef>
+                          <a:spcPts val="0"/>
+                        </a:spcBef>
+                        <a:spcAft>
+                          <a:spcPts val="0"/>
+                        </a:spcAft>
+                        <a:buClrTx/>
+                        <a:buSzTx/>
+                        <a:buFontTx/>
+                        <a:buNone/>
+                        <a:tabLst/>
+                        <a:defRPr/>
+                      </a:pPr>
+                      <a:r>
+                        <a:rPr lang="en-US" dirty="0"/>
+                        <a:t>Part cost (pennies) </a:t>
+                      </a:r>
+                    </a:p>
+                  </a:txBody>
+                  <a:tcPr/>
+                </a:tc>
+                <a:tc>
+                  <a:txBody>
+                    <a:bodyPr/>
+                    <a:lstStyle/>
+                    <a:p>
+                      <a:endParaRPr lang="en-US" dirty="0"/>
+                    </a:p>
+                  </a:txBody>
+                  <a:tcPr/>
+                </a:tc>
+                <a:tc>
+                  <a:txBody>
+                    <a:bodyPr/>
+                    <a:lstStyle/>
+                    <a:p>
+                      <a:endParaRPr lang="en-US" dirty="0"/>
+                    </a:p>
+                  </a:txBody>
+                  <a:tcPr/>
+                </a:tc>
+                <a:extLst>
+                  <a:ext uri="{0D108BD9-81ED-4DB2-BD59-A6C34878D82A}">
+                    <a16:rowId xmlns:a16="http://schemas.microsoft.com/office/drawing/2014/main" val="836048738"/>
+                  </a:ext>
+                </a:extLst>
+              </a:tr>
+              <a:tr h="370840">
+                <a:tc>
+                  <a:txBody>
+                    <a:bodyPr/>
+                    <a:lstStyle/>
+                    <a:p>
+                      <a:pPr algn="ctr"/>
+                      <a:r>
+                        <a:rPr lang="en-US" dirty="0"/>
+                        <a:t>5</a:t>
+                      </a:r>
+                    </a:p>
+                  </a:txBody>
+                  <a:tcPr/>
+                </a:tc>
+                <a:tc>
+                  <a:txBody>
+                    <a:bodyPr/>
+                    <a:lstStyle/>
+                    <a:p>
+                      <a:endParaRPr lang="en-US" dirty="0"/>
+                    </a:p>
+                  </a:txBody>
+                  <a:tcPr/>
+                </a:tc>
+                <a:tc>
+                  <a:txBody>
+                    <a:bodyPr/>
+                    <a:lstStyle/>
+                    <a:p>
+                      <a:pPr marL="0" marR="0" lvl="0" indent="0" algn="l" defTabSz="914400" rtl="0" eaLnBrk="1" fontAlgn="auto" latinLnBrk="0" hangingPunct="1">
+                        <a:lnSpc>
+                          <a:spcPct val="100000"/>
+                        </a:lnSpc>
+                        <a:spcBef>
+                          <a:spcPts val="0"/>
+                        </a:spcBef>
+                        <a:spcAft>
+                          <a:spcPts val="0"/>
+                        </a:spcAft>
+                        <a:buClrTx/>
+                        <a:buSzTx/>
+                        <a:buFontTx/>
+                        <a:buNone/>
+                        <a:tabLst/>
+                        <a:defRPr/>
+                      </a:pPr>
+                      <a:endParaRPr lang="en-US" dirty="0"/>
+                    </a:p>
+                  </a:txBody>
+                  <a:tcPr/>
+                </a:tc>
+                <a:tc>
+                  <a:txBody>
+                    <a:bodyPr/>
+                    <a:lstStyle/>
+                    <a:p>
+                      <a:pPr marL="0" marR="0" lvl="0" indent="0" algn="l" defTabSz="914400" rtl="0" eaLnBrk="1" fontAlgn="auto" latinLnBrk="0" hangingPunct="1">
+                        <a:lnSpc>
+                          <a:spcPct val="100000"/>
+                        </a:lnSpc>
+                        <a:spcBef>
+                          <a:spcPts val="0"/>
+                        </a:spcBef>
+                        <a:spcAft>
+                          <a:spcPts val="0"/>
+                        </a:spcAft>
+                        <a:buClrTx/>
+                        <a:buSzTx/>
+                        <a:buFontTx/>
+                        <a:buNone/>
+                        <a:tabLst/>
+                        <a:defRPr/>
+                      </a:pPr>
+                      <a:endParaRPr lang="en-US" dirty="0"/>
+                    </a:p>
+                  </a:txBody>
+                  <a:tcPr/>
+                </a:tc>
+                <a:tc>
+                  <a:txBody>
+                    <a:bodyPr/>
+                    <a:lstStyle/>
+                    <a:p>
+                      <a:endParaRPr lang="en-US" dirty="0"/>
+                    </a:p>
+                  </a:txBody>
+                  <a:tcPr/>
+                </a:tc>
+                <a:tc>
+                  <a:txBody>
+                    <a:bodyPr/>
+                    <a:lstStyle/>
+                    <a:p>
+                      <a:endParaRPr lang="en-US" dirty="0"/>
+                    </a:p>
+                  </a:txBody>
+                  <a:tcPr/>
+                </a:tc>
+                <a:extLst>
+                  <a:ext uri="{0D108BD9-81ED-4DB2-BD59-A6C34878D82A}">
+                    <a16:rowId xmlns:a16="http://schemas.microsoft.com/office/drawing/2014/main" val="4283437293"/>
+                  </a:ext>
+                </a:extLst>
+              </a:tr>
+              <a:tr h="370840">
+                <a:tc>
+                  <a:txBody>
+                    <a:bodyPr/>
+                    <a:lstStyle/>
+                    <a:p>
+                      <a:pPr algn="ctr"/>
+                      <a:r>
+                        <a:rPr lang="en-US" dirty="0"/>
+                        <a:t>6</a:t>
+                      </a:r>
+                    </a:p>
+                  </a:txBody>
+                  <a:tcPr/>
+                </a:tc>
+                <a:tc>
+                  <a:txBody>
+                    <a:bodyPr/>
+                    <a:lstStyle/>
+                    <a:p>
+                      <a:endParaRPr lang="en-US" dirty="0"/>
+                    </a:p>
+                  </a:txBody>
+                  <a:tcPr/>
+                </a:tc>
+                <a:tc>
+                  <a:txBody>
+                    <a:bodyPr/>
+                    <a:lstStyle/>
+                    <a:p>
+                      <a:pPr marL="0" marR="0" lvl="0" indent="0" algn="l" defTabSz="914400" rtl="0" eaLnBrk="1" fontAlgn="auto" latinLnBrk="0" hangingPunct="1">
+                        <a:lnSpc>
+                          <a:spcPct val="100000"/>
+                        </a:lnSpc>
+                        <a:spcBef>
+                          <a:spcPts val="0"/>
+                        </a:spcBef>
+                        <a:spcAft>
+                          <a:spcPts val="0"/>
+                        </a:spcAft>
+                        <a:buClrTx/>
+                        <a:buSzTx/>
+                        <a:buFontTx/>
+                        <a:buNone/>
+                        <a:tabLst/>
+                        <a:defRPr/>
+                      </a:pPr>
+                      <a:endParaRPr lang="en-US" dirty="0"/>
+                    </a:p>
+                  </a:txBody>
+                  <a:tcPr/>
+                </a:tc>
+                <a:tc>
+                  <a:txBody>
+                    <a:bodyPr/>
+                    <a:lstStyle/>
+                    <a:p>
+                      <a:pPr marL="0" marR="0" lvl="0" indent="0" algn="l" defTabSz="914400" rtl="0" eaLnBrk="1" fontAlgn="auto" latinLnBrk="0" hangingPunct="1">
+                        <a:lnSpc>
+                          <a:spcPct val="100000"/>
+                        </a:lnSpc>
+                        <a:spcBef>
+                          <a:spcPts val="0"/>
+                        </a:spcBef>
+                        <a:spcAft>
+                          <a:spcPts val="0"/>
+                        </a:spcAft>
+                        <a:buClrTx/>
+                        <a:buSzTx/>
+                        <a:buFontTx/>
+                        <a:buNone/>
+                        <a:tabLst/>
+                        <a:defRPr/>
+                      </a:pPr>
+                      <a:endParaRPr lang="en-US" dirty="0"/>
+                    </a:p>
+                  </a:txBody>
+                  <a:tcPr/>
+                </a:tc>
+                <a:tc>
+                  <a:txBody>
+                    <a:bodyPr/>
+                    <a:lstStyle/>
+                    <a:p>
+                      <a:endParaRPr lang="en-US" dirty="0"/>
+                    </a:p>
+                  </a:txBody>
+                  <a:tcPr/>
+                </a:tc>
+                <a:tc>
+                  <a:txBody>
+                    <a:bodyPr/>
+                    <a:lstStyle/>
+                    <a:p>
+                      <a:endParaRPr lang="en-US" dirty="0"/>
+                    </a:p>
+                  </a:txBody>
+                  <a:tcPr/>
+                </a:tc>
+                <a:extLst>
+                  <a:ext uri="{0D108BD9-81ED-4DB2-BD59-A6C34878D82A}">
+                    <a16:rowId xmlns:a16="http://schemas.microsoft.com/office/drawing/2014/main" val="2176051796"/>
+                  </a:ext>
+                </a:extLst>
+              </a:tr>
+            </a:tbl>
+          </a:graphicData>
+        </a:graphic>
+      </p:graphicFrame>
     </p:spTree>
     <p:extLst>
       <p:ext uri="{BB962C8B-B14F-4D97-AF65-F5344CB8AC3E}">
-        <p14:creationId xmlns:p14="http://schemas.microsoft.com/office/powerpoint/2010/main" val="3443242970"/>
+        <p14:creationId xmlns:p14="http://schemas.microsoft.com/office/powerpoint/2010/main" val="1141154377"/>
       </p:ext>
     </p:extLst>
   </p:cSld>

</xml_diff>